<commit_message>
update powerpoint to include schedule
</commit_message>
<xml_diff>
--- a/Data Privacy Workshop.pptx
+++ b/Data Privacy Workshop.pptx
@@ -10,7 +10,7 @@
   <p:sldIdLst>
     <p:sldId id="256" r:id="rId2"/>
     <p:sldId id="297" r:id="rId3"/>
-    <p:sldId id="257" r:id="rId4"/>
+    <p:sldId id="370" r:id="rId4"/>
     <p:sldId id="336" r:id="rId5"/>
     <p:sldId id="354" r:id="rId6"/>
     <p:sldId id="289" r:id="rId7"/>
@@ -202,7 +202,7 @@
           <p14:sldIdLst>
             <p14:sldId id="256"/>
             <p14:sldId id="297"/>
-            <p14:sldId id="257"/>
+            <p14:sldId id="370"/>
             <p14:sldId id="336"/>
             <p14:sldId id="354"/>
             <p14:sldId id="289"/>
@@ -329,121 +329,6 @@
 
 <file path=ppt/changesInfos/changesInfo1.xml><?xml version="1.0" encoding="utf-8"?>
 <pc:chgInfo xmlns:a="http://schemas.openxmlformats.org/drawingml/2006/main" xmlns:r="http://schemas.openxmlformats.org/officeDocument/2006/relationships" xmlns:ac="http://schemas.microsoft.com/office/drawing/2013/main/command" xmlns:pc="http://schemas.microsoft.com/office/powerpoint/2013/main/command">
-  <pc:docChgLst>
-    <pc:chgData name="Teo Xue Jun" userId="0ec9196c-e60d-4330-a032-9d5d7c3c7f89" providerId="ADAL" clId="{25A412C4-30B7-4A40-804D-812B76098C7F}"/>
-    <pc:docChg chg="undo custSel addSld modSld sldOrd modSection">
-      <pc:chgData name="Teo Xue Jun" userId="0ec9196c-e60d-4330-a032-9d5d7c3c7f89" providerId="ADAL" clId="{25A412C4-30B7-4A40-804D-812B76098C7F}" dt="2020-12-01T08:08:49.370" v="27" actId="20577"/>
-      <pc:docMkLst>
-        <pc:docMk/>
-      </pc:docMkLst>
-      <pc:sldChg chg="ord">
-        <pc:chgData name="Teo Xue Jun" userId="0ec9196c-e60d-4330-a032-9d5d7c3c7f89" providerId="ADAL" clId="{25A412C4-30B7-4A40-804D-812B76098C7F}" dt="2020-12-01T08:08:39.429" v="23" actId="20578"/>
-        <pc:sldMkLst>
-          <pc:docMk/>
-          <pc:sldMk cId="4010072076" sldId="283"/>
-        </pc:sldMkLst>
-      </pc:sldChg>
-      <pc:sldChg chg="modSp mod">
-        <pc:chgData name="Teo Xue Jun" userId="0ec9196c-e60d-4330-a032-9d5d7c3c7f89" providerId="ADAL" clId="{25A412C4-30B7-4A40-804D-812B76098C7F}" dt="2020-12-01T08:08:43.786" v="25" actId="20577"/>
-        <pc:sldMkLst>
-          <pc:docMk/>
-          <pc:sldMk cId="924775409" sldId="316"/>
-        </pc:sldMkLst>
-        <pc:spChg chg="mod">
-          <ac:chgData name="Teo Xue Jun" userId="0ec9196c-e60d-4330-a032-9d5d7c3c7f89" providerId="ADAL" clId="{25A412C4-30B7-4A40-804D-812B76098C7F}" dt="2020-12-01T08:08:12.779" v="16" actId="20577"/>
-          <ac:spMkLst>
-            <pc:docMk/>
-            <pc:sldMk cId="924775409" sldId="316"/>
-            <ac:spMk id="2" creationId="{0741C2B4-F697-4C35-BC38-2066FE6C0A83}"/>
-          </ac:spMkLst>
-        </pc:spChg>
-        <pc:spChg chg="mod">
-          <ac:chgData name="Teo Xue Jun" userId="0ec9196c-e60d-4330-a032-9d5d7c3c7f89" providerId="ADAL" clId="{25A412C4-30B7-4A40-804D-812B76098C7F}" dt="2020-12-01T08:08:43.786" v="25" actId="20577"/>
-          <ac:spMkLst>
-            <pc:docMk/>
-            <pc:sldMk cId="924775409" sldId="316"/>
-            <ac:spMk id="4" creationId="{CB5A9CB5-92A4-408D-B92B-18E9B98F063F}"/>
-          </ac:spMkLst>
-        </pc:spChg>
-      </pc:sldChg>
-      <pc:sldChg chg="modSp mod ord">
-        <pc:chgData name="Teo Xue Jun" userId="0ec9196c-e60d-4330-a032-9d5d7c3c7f89" providerId="ADAL" clId="{25A412C4-30B7-4A40-804D-812B76098C7F}" dt="2020-12-01T08:08:49.370" v="27" actId="20577"/>
-        <pc:sldMkLst>
-          <pc:docMk/>
-          <pc:sldMk cId="1527679443" sldId="317"/>
-        </pc:sldMkLst>
-        <pc:spChg chg="mod">
-          <ac:chgData name="Teo Xue Jun" userId="0ec9196c-e60d-4330-a032-9d5d7c3c7f89" providerId="ADAL" clId="{25A412C4-30B7-4A40-804D-812B76098C7F}" dt="2020-12-01T08:08:23.010" v="20" actId="20577"/>
-          <ac:spMkLst>
-            <pc:docMk/>
-            <pc:sldMk cId="1527679443" sldId="317"/>
-            <ac:spMk id="2" creationId="{0741C2B4-F697-4C35-BC38-2066FE6C0A83}"/>
-          </ac:spMkLst>
-        </pc:spChg>
-        <pc:spChg chg="mod">
-          <ac:chgData name="Teo Xue Jun" userId="0ec9196c-e60d-4330-a032-9d5d7c3c7f89" providerId="ADAL" clId="{25A412C4-30B7-4A40-804D-812B76098C7F}" dt="2020-12-01T08:08:49.370" v="27" actId="20577"/>
-          <ac:spMkLst>
-            <pc:docMk/>
-            <pc:sldMk cId="1527679443" sldId="317"/>
-            <ac:spMk id="4" creationId="{CB5A9CB5-92A4-408D-B92B-18E9B98F063F}"/>
-          </ac:spMkLst>
-        </pc:spChg>
-      </pc:sldChg>
-      <pc:sldChg chg="modSp mod">
-        <pc:chgData name="Teo Xue Jun" userId="0ec9196c-e60d-4330-a032-9d5d7c3c7f89" providerId="ADAL" clId="{25A412C4-30B7-4A40-804D-812B76098C7F}" dt="2020-12-01T08:08:18.931" v="18" actId="20577"/>
-        <pc:sldMkLst>
-          <pc:docMk/>
-          <pc:sldMk cId="3242129977" sldId="329"/>
-        </pc:sldMkLst>
-        <pc:spChg chg="mod">
-          <ac:chgData name="Teo Xue Jun" userId="0ec9196c-e60d-4330-a032-9d5d7c3c7f89" providerId="ADAL" clId="{25A412C4-30B7-4A40-804D-812B76098C7F}" dt="2020-12-01T08:08:18.931" v="18" actId="20577"/>
-          <ac:spMkLst>
-            <pc:docMk/>
-            <pc:sldMk cId="3242129977" sldId="329"/>
-            <ac:spMk id="2" creationId="{C8E1A20D-6AA2-FA43-8D24-841163C1076E}"/>
-          </ac:spMkLst>
-        </pc:spChg>
-      </pc:sldChg>
-      <pc:sldChg chg="modSp mod ord">
-        <pc:chgData name="Teo Xue Jun" userId="0ec9196c-e60d-4330-a032-9d5d7c3c7f89" providerId="ADAL" clId="{25A412C4-30B7-4A40-804D-812B76098C7F}" dt="2020-12-01T08:08:39.429" v="23" actId="20578"/>
-        <pc:sldMkLst>
-          <pc:docMk/>
-          <pc:sldMk cId="747540316" sldId="330"/>
-        </pc:sldMkLst>
-        <pc:spChg chg="mod">
-          <ac:chgData name="Teo Xue Jun" userId="0ec9196c-e60d-4330-a032-9d5d7c3c7f89" providerId="ADAL" clId="{25A412C4-30B7-4A40-804D-812B76098C7F}" dt="2020-12-01T08:08:27.825" v="22" actId="20577"/>
-          <ac:spMkLst>
-            <pc:docMk/>
-            <pc:sldMk cId="747540316" sldId="330"/>
-            <ac:spMk id="2" creationId="{C8E1A20D-6AA2-FA43-8D24-841163C1076E}"/>
-          </ac:spMkLst>
-        </pc:spChg>
-      </pc:sldChg>
-      <pc:sldChg chg="addSp modSp new mod">
-        <pc:chgData name="Teo Xue Jun" userId="0ec9196c-e60d-4330-a032-9d5d7c3c7f89" providerId="ADAL" clId="{25A412C4-30B7-4A40-804D-812B76098C7F}" dt="2020-12-01T01:55:30.151" v="12" actId="1076"/>
-        <pc:sldMkLst>
-          <pc:docMk/>
-          <pc:sldMk cId="267374613" sldId="362"/>
-        </pc:sldMkLst>
-        <pc:spChg chg="mod">
-          <ac:chgData name="Teo Xue Jun" userId="0ec9196c-e60d-4330-a032-9d5d7c3c7f89" providerId="ADAL" clId="{25A412C4-30B7-4A40-804D-812B76098C7F}" dt="2020-12-01T01:54:50.725" v="9" actId="20577"/>
-          <ac:spMkLst>
-            <pc:docMk/>
-            <pc:sldMk cId="267374613" sldId="362"/>
-            <ac:spMk id="2" creationId="{74CCF75B-4633-2D42-B3BF-58CA9B6CD65B}"/>
-          </ac:spMkLst>
-        </pc:spChg>
-        <pc:picChg chg="add mod">
-          <ac:chgData name="Teo Xue Jun" userId="0ec9196c-e60d-4330-a032-9d5d7c3c7f89" providerId="ADAL" clId="{25A412C4-30B7-4A40-804D-812B76098C7F}" dt="2020-12-01T01:55:30.151" v="12" actId="1076"/>
-          <ac:picMkLst>
-            <pc:docMk/>
-            <pc:sldMk cId="267374613" sldId="362"/>
-            <ac:picMk id="1026" creationId="{26F4DBDE-C709-6547-A63E-AC474D1C750A}"/>
-          </ac:picMkLst>
-        </pc:picChg>
-      </pc:sldChg>
-    </pc:docChg>
-  </pc:docChgLst>
   <pc:docChgLst>
     <pc:chgData name="Teo Xue Jun" userId="0ec9196c-e60d-4330-a032-9d5d7c3c7f89" providerId="ADAL" clId="{C8F0C296-DCBE-F146-83D0-F3B2A427DC22}"/>
     <pc:docChg chg="undo custSel mod addSld delSld modSld sldOrd modSection">
@@ -2968,6 +2853,483 @@
     </pc:docChg>
   </pc:docChgLst>
   <pc:docChgLst>
+    <pc:chgData name="Teo Xue Jun" userId="0ec9196c-e60d-4330-a032-9d5d7c3c7f89" providerId="ADAL" clId="{95034E7A-1516-304B-B14C-514392E48D74}"/>
+    <pc:docChg chg="undo custSel mod modSld">
+      <pc:chgData name="Teo Xue Jun" userId="0ec9196c-e60d-4330-a032-9d5d7c3c7f89" providerId="ADAL" clId="{95034E7A-1516-304B-B14C-514392E48D74}" dt="2020-11-12T09:19:04.949" v="62" actId="20577"/>
+      <pc:docMkLst>
+        <pc:docMk/>
+      </pc:docMkLst>
+      <pc:sldChg chg="addSp modSp mod">
+        <pc:chgData name="Teo Xue Jun" userId="0ec9196c-e60d-4330-a032-9d5d7c3c7f89" providerId="ADAL" clId="{95034E7A-1516-304B-B14C-514392E48D74}" dt="2020-11-12T08:41:27.516" v="22" actId="20577"/>
+        <pc:sldMkLst>
+          <pc:docMk/>
+          <pc:sldMk cId="2178540148" sldId="256"/>
+        </pc:sldMkLst>
+        <pc:spChg chg="mod">
+          <ac:chgData name="Teo Xue Jun" userId="0ec9196c-e60d-4330-a032-9d5d7c3c7f89" providerId="ADAL" clId="{95034E7A-1516-304B-B14C-514392E48D74}" dt="2020-11-12T08:41:27.516" v="22" actId="20577"/>
+          <ac:spMkLst>
+            <pc:docMk/>
+            <pc:sldMk cId="2178540148" sldId="256"/>
+            <ac:spMk id="2" creationId="{84236FC9-365E-462F-8085-8E712936325F}"/>
+          </ac:spMkLst>
+        </pc:spChg>
+        <pc:picChg chg="add mod">
+          <ac:chgData name="Teo Xue Jun" userId="0ec9196c-e60d-4330-a032-9d5d7c3c7f89" providerId="ADAL" clId="{95034E7A-1516-304B-B14C-514392E48D74}" dt="2020-11-12T08:41:22.512" v="13" actId="1076"/>
+          <ac:picMkLst>
+            <pc:docMk/>
+            <pc:sldMk cId="2178540148" sldId="256"/>
+            <ac:picMk id="1026" creationId="{1841AACC-B084-1147-B5EC-7901DE52F7EE}"/>
+          </ac:picMkLst>
+        </pc:picChg>
+      </pc:sldChg>
+      <pc:sldChg chg="addSp delSp modSp mod setBg">
+        <pc:chgData name="Teo Xue Jun" userId="0ec9196c-e60d-4330-a032-9d5d7c3c7f89" providerId="ADAL" clId="{95034E7A-1516-304B-B14C-514392E48D74}" dt="2020-11-12T09:13:50.698" v="61"/>
+        <pc:sldMkLst>
+          <pc:docMk/>
+          <pc:sldMk cId="1217361202" sldId="257"/>
+        </pc:sldMkLst>
+        <pc:spChg chg="mod">
+          <ac:chgData name="Teo Xue Jun" userId="0ec9196c-e60d-4330-a032-9d5d7c3c7f89" providerId="ADAL" clId="{95034E7A-1516-304B-B14C-514392E48D74}" dt="2020-11-12T08:25:23.735" v="5" actId="26606"/>
+          <ac:spMkLst>
+            <pc:docMk/>
+            <pc:sldMk cId="1217361202" sldId="257"/>
+            <ac:spMk id="2" creationId="{5FD818B8-89A2-47A5-85EC-9ED1B9B407D4}"/>
+          </ac:spMkLst>
+        </pc:spChg>
+        <pc:spChg chg="mod">
+          <ac:chgData name="Teo Xue Jun" userId="0ec9196c-e60d-4330-a032-9d5d7c3c7f89" providerId="ADAL" clId="{95034E7A-1516-304B-B14C-514392E48D74}" dt="2020-11-12T09:13:50.698" v="61"/>
+          <ac:spMkLst>
+            <pc:docMk/>
+            <pc:sldMk cId="1217361202" sldId="257"/>
+            <ac:spMk id="4" creationId="{375B1118-F33A-44AC-8111-C1DF893BB056}"/>
+          </ac:spMkLst>
+        </pc:spChg>
+        <pc:spChg chg="add del">
+          <ac:chgData name="Teo Xue Jun" userId="0ec9196c-e60d-4330-a032-9d5d7c3c7f89" providerId="ADAL" clId="{95034E7A-1516-304B-B14C-514392E48D74}" dt="2020-11-12T08:25:23.735" v="5" actId="26606"/>
+          <ac:spMkLst>
+            <pc:docMk/>
+            <pc:sldMk cId="1217361202" sldId="257"/>
+            <ac:spMk id="9" creationId="{64F519EA-836C-4E21-87EE-CE7AB018636F}"/>
+          </ac:spMkLst>
+        </pc:spChg>
+        <pc:spChg chg="add del">
+          <ac:chgData name="Teo Xue Jun" userId="0ec9196c-e60d-4330-a032-9d5d7c3c7f89" providerId="ADAL" clId="{95034E7A-1516-304B-B14C-514392E48D74}" dt="2020-11-12T08:25:23.735" v="5" actId="26606"/>
+          <ac:spMkLst>
+            <pc:docMk/>
+            <pc:sldMk cId="1217361202" sldId="257"/>
+            <ac:spMk id="11" creationId="{E3E51905-F374-4E1A-97CF-B741584B74D5}"/>
+          </ac:spMkLst>
+        </pc:spChg>
+        <pc:spChg chg="add del">
+          <ac:chgData name="Teo Xue Jun" userId="0ec9196c-e60d-4330-a032-9d5d7c3c7f89" providerId="ADAL" clId="{95034E7A-1516-304B-B14C-514392E48D74}" dt="2020-11-12T08:25:23.735" v="5" actId="26606"/>
+          <ac:spMkLst>
+            <pc:docMk/>
+            <pc:sldMk cId="1217361202" sldId="257"/>
+            <ac:spMk id="13" creationId="{A210685A-6235-45A7-850D-A6F555466EF7}"/>
+          </ac:spMkLst>
+        </pc:spChg>
+        <pc:grpChg chg="add del">
+          <ac:chgData name="Teo Xue Jun" userId="0ec9196c-e60d-4330-a032-9d5d7c3c7f89" providerId="ADAL" clId="{95034E7A-1516-304B-B14C-514392E48D74}" dt="2020-11-12T08:25:23.735" v="5" actId="26606"/>
+          <ac:grpSpMkLst>
+            <pc:docMk/>
+            <pc:sldMk cId="1217361202" sldId="257"/>
+            <ac:grpSpMk id="15" creationId="{C833A70A-9722-46F0-A5EB-C72F78747079}"/>
+          </ac:grpSpMkLst>
+        </pc:grpChg>
+      </pc:sldChg>
+      <pc:sldChg chg="addSp delSp modSp">
+        <pc:chgData name="Teo Xue Jun" userId="0ec9196c-e60d-4330-a032-9d5d7c3c7f89" providerId="ADAL" clId="{95034E7A-1516-304B-B14C-514392E48D74}" dt="2020-11-12T09:13:41.430" v="60"/>
+        <pc:sldMkLst>
+          <pc:docMk/>
+          <pc:sldMk cId="3034473221" sldId="280"/>
+        </pc:sldMkLst>
+        <pc:spChg chg="add del mod">
+          <ac:chgData name="Teo Xue Jun" userId="0ec9196c-e60d-4330-a032-9d5d7c3c7f89" providerId="ADAL" clId="{95034E7A-1516-304B-B14C-514392E48D74}" dt="2020-11-12T09:13:41.430" v="60"/>
+          <ac:spMkLst>
+            <pc:docMk/>
+            <pc:sldMk cId="3034473221" sldId="280"/>
+            <ac:spMk id="2" creationId="{EB9F3863-7F5E-46D8-AC2D-A99C2A516C6E}"/>
+          </ac:spMkLst>
+        </pc:spChg>
+        <pc:spChg chg="add del mod">
+          <ac:chgData name="Teo Xue Jun" userId="0ec9196c-e60d-4330-a032-9d5d7c3c7f89" providerId="ADAL" clId="{95034E7A-1516-304B-B14C-514392E48D74}" dt="2020-11-12T09:13:27.575" v="58" actId="478"/>
+          <ac:spMkLst>
+            <pc:docMk/>
+            <pc:sldMk cId="3034473221" sldId="280"/>
+            <ac:spMk id="4" creationId="{480EFBA1-2BBF-A548-A6D5-690C0BB35911}"/>
+          </ac:spMkLst>
+        </pc:spChg>
+        <pc:picChg chg="add del">
+          <ac:chgData name="Teo Xue Jun" userId="0ec9196c-e60d-4330-a032-9d5d7c3c7f89" providerId="ADAL" clId="{95034E7A-1516-304B-B14C-514392E48D74}" dt="2020-11-12T09:13:28.640" v="59"/>
+          <ac:picMkLst>
+            <pc:docMk/>
+            <pc:sldMk cId="3034473221" sldId="280"/>
+            <ac:picMk id="2050" creationId="{D3454D65-526B-DB49-933D-D9347192B6E2}"/>
+          </ac:picMkLst>
+        </pc:picChg>
+      </pc:sldChg>
+      <pc:sldChg chg="addSp delSp modSp mod">
+        <pc:chgData name="Teo Xue Jun" userId="0ec9196c-e60d-4330-a032-9d5d7c3c7f89" providerId="ADAL" clId="{95034E7A-1516-304B-B14C-514392E48D74}" dt="2020-11-12T08:23:28.802" v="2" actId="26606"/>
+        <pc:sldMkLst>
+          <pc:docMk/>
+          <pc:sldMk cId="3528580822" sldId="297"/>
+        </pc:sldMkLst>
+        <pc:spChg chg="mod">
+          <ac:chgData name="Teo Xue Jun" userId="0ec9196c-e60d-4330-a032-9d5d7c3c7f89" providerId="ADAL" clId="{95034E7A-1516-304B-B14C-514392E48D74}" dt="2020-11-12T08:23:28.802" v="2" actId="26606"/>
+          <ac:spMkLst>
+            <pc:docMk/>
+            <pc:sldMk cId="3528580822" sldId="297"/>
+            <ac:spMk id="2" creationId="{4537F50B-F516-4FC8-A1E3-DC1D32D16468}"/>
+          </ac:spMkLst>
+        </pc:spChg>
+        <pc:spChg chg="mod">
+          <ac:chgData name="Teo Xue Jun" userId="0ec9196c-e60d-4330-a032-9d5d7c3c7f89" providerId="ADAL" clId="{95034E7A-1516-304B-B14C-514392E48D74}" dt="2020-11-12T08:23:28.802" v="2" actId="26606"/>
+          <ac:spMkLst>
+            <pc:docMk/>
+            <pc:sldMk cId="3528580822" sldId="297"/>
+            <ac:spMk id="3" creationId="{33D062B1-9B50-4616-B051-D0EC2856372F}"/>
+          </ac:spMkLst>
+        </pc:spChg>
+        <pc:spChg chg="del">
+          <ac:chgData name="Teo Xue Jun" userId="0ec9196c-e60d-4330-a032-9d5d7c3c7f89" providerId="ADAL" clId="{95034E7A-1516-304B-B14C-514392E48D74}" dt="2020-11-12T08:22:52.016" v="0" actId="26606"/>
+          <ac:spMkLst>
+            <pc:docMk/>
+            <pc:sldMk cId="3528580822" sldId="297"/>
+            <ac:spMk id="8" creationId="{3B854194-185D-494D-905C-7C7CB2E30F6E}"/>
+          </ac:spMkLst>
+        </pc:spChg>
+        <pc:spChg chg="del">
+          <ac:chgData name="Teo Xue Jun" userId="0ec9196c-e60d-4330-a032-9d5d7c3c7f89" providerId="ADAL" clId="{95034E7A-1516-304B-B14C-514392E48D74}" dt="2020-11-12T08:22:52.016" v="0" actId="26606"/>
+          <ac:spMkLst>
+            <pc:docMk/>
+            <pc:sldMk cId="3528580822" sldId="297"/>
+            <ac:spMk id="10" creationId="{B4F5FA0D-0104-4987-8241-EFF7C85B88DE}"/>
+          </ac:spMkLst>
+        </pc:spChg>
+        <pc:spChg chg="add del">
+          <ac:chgData name="Teo Xue Jun" userId="0ec9196c-e60d-4330-a032-9d5d7c3c7f89" providerId="ADAL" clId="{95034E7A-1516-304B-B14C-514392E48D74}" dt="2020-11-12T08:23:15.967" v="1" actId="26606"/>
+          <ac:spMkLst>
+            <pc:docMk/>
+            <pc:sldMk cId="3528580822" sldId="297"/>
+            <ac:spMk id="17" creationId="{081EA652-8C6A-4E69-BEB9-170809474553}"/>
+          </ac:spMkLst>
+        </pc:spChg>
+        <pc:spChg chg="add del">
+          <ac:chgData name="Teo Xue Jun" userId="0ec9196c-e60d-4330-a032-9d5d7c3c7f89" providerId="ADAL" clId="{95034E7A-1516-304B-B14C-514392E48D74}" dt="2020-11-12T08:23:15.967" v="1" actId="26606"/>
+          <ac:spMkLst>
+            <pc:docMk/>
+            <pc:sldMk cId="3528580822" sldId="297"/>
+            <ac:spMk id="19" creationId="{5298780A-33B9-4EA2-8F67-DE68AD62841B}"/>
+          </ac:spMkLst>
+        </pc:spChg>
+        <pc:spChg chg="add del">
+          <ac:chgData name="Teo Xue Jun" userId="0ec9196c-e60d-4330-a032-9d5d7c3c7f89" providerId="ADAL" clId="{95034E7A-1516-304B-B14C-514392E48D74}" dt="2020-11-12T08:23:15.967" v="1" actId="26606"/>
+          <ac:spMkLst>
+            <pc:docMk/>
+            <pc:sldMk cId="3528580822" sldId="297"/>
+            <ac:spMk id="21" creationId="{7F488E8B-4E1E-4402-8935-D4E6C02615C7}"/>
+          </ac:spMkLst>
+        </pc:spChg>
+        <pc:spChg chg="add del">
+          <ac:chgData name="Teo Xue Jun" userId="0ec9196c-e60d-4330-a032-9d5d7c3c7f89" providerId="ADAL" clId="{95034E7A-1516-304B-B14C-514392E48D74}" dt="2020-11-12T08:23:28.802" v="2" actId="26606"/>
+          <ac:spMkLst>
+            <pc:docMk/>
+            <pc:sldMk cId="3528580822" sldId="297"/>
+            <ac:spMk id="28" creationId="{18873D23-2DCF-4B31-A009-95721C06E8E1}"/>
+          </ac:spMkLst>
+        </pc:spChg>
+        <pc:spChg chg="add del">
+          <ac:chgData name="Teo Xue Jun" userId="0ec9196c-e60d-4330-a032-9d5d7c3c7f89" providerId="ADAL" clId="{95034E7A-1516-304B-B14C-514392E48D74}" dt="2020-11-12T08:23:28.802" v="2" actId="26606"/>
+          <ac:spMkLst>
+            <pc:docMk/>
+            <pc:sldMk cId="3528580822" sldId="297"/>
+            <ac:spMk id="30" creationId="{C13EF075-D4EF-4929-ADBC-91B27DA19955}"/>
+          </ac:spMkLst>
+        </pc:spChg>
+        <pc:spChg chg="add">
+          <ac:chgData name="Teo Xue Jun" userId="0ec9196c-e60d-4330-a032-9d5d7c3c7f89" providerId="ADAL" clId="{95034E7A-1516-304B-B14C-514392E48D74}" dt="2020-11-12T08:23:28.802" v="2" actId="26606"/>
+          <ac:spMkLst>
+            <pc:docMk/>
+            <pc:sldMk cId="3528580822" sldId="297"/>
+            <ac:spMk id="41" creationId="{64F519EA-836C-4E21-87EE-CE7AB018636F}"/>
+          </ac:spMkLst>
+        </pc:spChg>
+        <pc:spChg chg="add">
+          <ac:chgData name="Teo Xue Jun" userId="0ec9196c-e60d-4330-a032-9d5d7c3c7f89" providerId="ADAL" clId="{95034E7A-1516-304B-B14C-514392E48D74}" dt="2020-11-12T08:23:28.802" v="2" actId="26606"/>
+          <ac:spMkLst>
+            <pc:docMk/>
+            <pc:sldMk cId="3528580822" sldId="297"/>
+            <ac:spMk id="43" creationId="{E3E51905-F374-4E1A-97CF-B741584B74D5}"/>
+          </ac:spMkLst>
+        </pc:spChg>
+        <pc:spChg chg="add">
+          <ac:chgData name="Teo Xue Jun" userId="0ec9196c-e60d-4330-a032-9d5d7c3c7f89" providerId="ADAL" clId="{95034E7A-1516-304B-B14C-514392E48D74}" dt="2020-11-12T08:23:28.802" v="2" actId="26606"/>
+          <ac:spMkLst>
+            <pc:docMk/>
+            <pc:sldMk cId="3528580822" sldId="297"/>
+            <ac:spMk id="45" creationId="{A210685A-6235-45A7-850D-A6F555466EF7}"/>
+          </ac:spMkLst>
+        </pc:spChg>
+        <pc:grpChg chg="add del">
+          <ac:chgData name="Teo Xue Jun" userId="0ec9196c-e60d-4330-a032-9d5d7c3c7f89" providerId="ADAL" clId="{95034E7A-1516-304B-B14C-514392E48D74}" dt="2020-11-12T08:23:28.802" v="2" actId="26606"/>
+          <ac:grpSpMkLst>
+            <pc:docMk/>
+            <pc:sldMk cId="3528580822" sldId="297"/>
+            <ac:grpSpMk id="32" creationId="{DAA26DFA-AAB2-4973-9C17-16D587C7B198}"/>
+          </ac:grpSpMkLst>
+        </pc:grpChg>
+        <pc:grpChg chg="add">
+          <ac:chgData name="Teo Xue Jun" userId="0ec9196c-e60d-4330-a032-9d5d7c3c7f89" providerId="ADAL" clId="{95034E7A-1516-304B-B14C-514392E48D74}" dt="2020-11-12T08:23:28.802" v="2" actId="26606"/>
+          <ac:grpSpMkLst>
+            <pc:docMk/>
+            <pc:sldMk cId="3528580822" sldId="297"/>
+            <ac:grpSpMk id="47" creationId="{C833A70A-9722-46F0-A5EB-C72F78747079}"/>
+          </ac:grpSpMkLst>
+        </pc:grpChg>
+        <pc:picChg chg="del">
+          <ac:chgData name="Teo Xue Jun" userId="0ec9196c-e60d-4330-a032-9d5d7c3c7f89" providerId="ADAL" clId="{95034E7A-1516-304B-B14C-514392E48D74}" dt="2020-11-12T08:22:52.016" v="0" actId="26606"/>
+          <ac:picMkLst>
+            <pc:docMk/>
+            <pc:sldMk cId="3528580822" sldId="297"/>
+            <ac:picMk id="12" creationId="{2897127E-6CEF-446C-BE87-93B7C46E49D1}"/>
+          </ac:picMkLst>
+        </pc:picChg>
+        <pc:cxnChg chg="add del">
+          <ac:chgData name="Teo Xue Jun" userId="0ec9196c-e60d-4330-a032-9d5d7c3c7f89" providerId="ADAL" clId="{95034E7A-1516-304B-B14C-514392E48D74}" dt="2020-11-12T08:23:15.967" v="1" actId="26606"/>
+          <ac:cxnSpMkLst>
+            <pc:docMk/>
+            <pc:sldMk cId="3528580822" sldId="297"/>
+            <ac:cxnSpMk id="23" creationId="{23AAC9B5-8015-485C-ACF9-A750390E9A56}"/>
+          </ac:cxnSpMkLst>
+        </pc:cxnChg>
+      </pc:sldChg>
+      <pc:sldChg chg="modSp mod">
+        <pc:chgData name="Teo Xue Jun" userId="0ec9196c-e60d-4330-a032-9d5d7c3c7f89" providerId="ADAL" clId="{95034E7A-1516-304B-B14C-514392E48D74}" dt="2020-11-12T08:47:44.663" v="35" actId="20577"/>
+        <pc:sldMkLst>
+          <pc:docMk/>
+          <pc:sldMk cId="4193163313" sldId="304"/>
+        </pc:sldMkLst>
+        <pc:spChg chg="mod">
+          <ac:chgData name="Teo Xue Jun" userId="0ec9196c-e60d-4330-a032-9d5d7c3c7f89" providerId="ADAL" clId="{95034E7A-1516-304B-B14C-514392E48D74}" dt="2020-11-12T08:47:44.663" v="35" actId="20577"/>
+          <ac:spMkLst>
+            <pc:docMk/>
+            <pc:sldMk cId="4193163313" sldId="304"/>
+            <ac:spMk id="3" creationId="{BA9DD1DD-8ECD-4C1D-9B6C-119D81E86128}"/>
+          </ac:spMkLst>
+        </pc:spChg>
+      </pc:sldChg>
+      <pc:sldChg chg="addSp delSp modSp mod">
+        <pc:chgData name="Teo Xue Jun" userId="0ec9196c-e60d-4330-a032-9d5d7c3c7f89" providerId="ADAL" clId="{95034E7A-1516-304B-B14C-514392E48D74}" dt="2020-11-12T09:19:04.949" v="62" actId="20577"/>
+        <pc:sldMkLst>
+          <pc:docMk/>
+          <pc:sldMk cId="3396157166" sldId="336"/>
+        </pc:sldMkLst>
+        <pc:spChg chg="mod">
+          <ac:chgData name="Teo Xue Jun" userId="0ec9196c-e60d-4330-a032-9d5d7c3c7f89" providerId="ADAL" clId="{95034E7A-1516-304B-B14C-514392E48D74}" dt="2020-11-12T08:24:09.061" v="3" actId="26606"/>
+          <ac:spMkLst>
+            <pc:docMk/>
+            <pc:sldMk cId="3396157166" sldId="336"/>
+            <ac:spMk id="5" creationId="{89F32E64-544A-0645-860C-0EB961438F20}"/>
+          </ac:spMkLst>
+        </pc:spChg>
+        <pc:spChg chg="mod">
+          <ac:chgData name="Teo Xue Jun" userId="0ec9196c-e60d-4330-a032-9d5d7c3c7f89" providerId="ADAL" clId="{95034E7A-1516-304B-B14C-514392E48D74}" dt="2020-11-12T09:19:04.949" v="62" actId="20577"/>
+          <ac:spMkLst>
+            <pc:docMk/>
+            <pc:sldMk cId="3396157166" sldId="336"/>
+            <ac:spMk id="6" creationId="{98EFFE90-BA0D-F440-8E15-5C9FBAB49DDC}"/>
+          </ac:spMkLst>
+        </pc:spChg>
+        <pc:spChg chg="del">
+          <ac:chgData name="Teo Xue Jun" userId="0ec9196c-e60d-4330-a032-9d5d7c3c7f89" providerId="ADAL" clId="{95034E7A-1516-304B-B14C-514392E48D74}" dt="2020-11-12T08:24:09.061" v="3" actId="26606"/>
+          <ac:spMkLst>
+            <pc:docMk/>
+            <pc:sldMk cId="3396157166" sldId="336"/>
+            <ac:spMk id="11" creationId="{3B854194-185D-494D-905C-7C7CB2E30F6E}"/>
+          </ac:spMkLst>
+        </pc:spChg>
+        <pc:spChg chg="del">
+          <ac:chgData name="Teo Xue Jun" userId="0ec9196c-e60d-4330-a032-9d5d7c3c7f89" providerId="ADAL" clId="{95034E7A-1516-304B-B14C-514392E48D74}" dt="2020-11-12T08:24:09.061" v="3" actId="26606"/>
+          <ac:spMkLst>
+            <pc:docMk/>
+            <pc:sldMk cId="3396157166" sldId="336"/>
+            <ac:spMk id="13" creationId="{B4F5FA0D-0104-4987-8241-EFF7C85B88DE}"/>
+          </ac:spMkLst>
+        </pc:spChg>
+        <pc:spChg chg="add">
+          <ac:chgData name="Teo Xue Jun" userId="0ec9196c-e60d-4330-a032-9d5d7c3c7f89" providerId="ADAL" clId="{95034E7A-1516-304B-B14C-514392E48D74}" dt="2020-11-12T08:24:09.061" v="3" actId="26606"/>
+          <ac:spMkLst>
+            <pc:docMk/>
+            <pc:sldMk cId="3396157166" sldId="336"/>
+            <ac:spMk id="20" creationId="{64F519EA-836C-4E21-87EE-CE7AB018636F}"/>
+          </ac:spMkLst>
+        </pc:spChg>
+        <pc:spChg chg="add">
+          <ac:chgData name="Teo Xue Jun" userId="0ec9196c-e60d-4330-a032-9d5d7c3c7f89" providerId="ADAL" clId="{95034E7A-1516-304B-B14C-514392E48D74}" dt="2020-11-12T08:24:09.061" v="3" actId="26606"/>
+          <ac:spMkLst>
+            <pc:docMk/>
+            <pc:sldMk cId="3396157166" sldId="336"/>
+            <ac:spMk id="22" creationId="{E3E51905-F374-4E1A-97CF-B741584B74D5}"/>
+          </ac:spMkLst>
+        </pc:spChg>
+        <pc:spChg chg="add">
+          <ac:chgData name="Teo Xue Jun" userId="0ec9196c-e60d-4330-a032-9d5d7c3c7f89" providerId="ADAL" clId="{95034E7A-1516-304B-B14C-514392E48D74}" dt="2020-11-12T08:24:09.061" v="3" actId="26606"/>
+          <ac:spMkLst>
+            <pc:docMk/>
+            <pc:sldMk cId="3396157166" sldId="336"/>
+            <ac:spMk id="24" creationId="{A210685A-6235-45A7-850D-A6F555466EF7}"/>
+          </ac:spMkLst>
+        </pc:spChg>
+        <pc:grpChg chg="add">
+          <ac:chgData name="Teo Xue Jun" userId="0ec9196c-e60d-4330-a032-9d5d7c3c7f89" providerId="ADAL" clId="{95034E7A-1516-304B-B14C-514392E48D74}" dt="2020-11-12T08:24:09.061" v="3" actId="26606"/>
+          <ac:grpSpMkLst>
+            <pc:docMk/>
+            <pc:sldMk cId="3396157166" sldId="336"/>
+            <ac:grpSpMk id="26" creationId="{C833A70A-9722-46F0-A5EB-C72F78747079}"/>
+          </ac:grpSpMkLst>
+        </pc:grpChg>
+        <pc:picChg chg="del">
+          <ac:chgData name="Teo Xue Jun" userId="0ec9196c-e60d-4330-a032-9d5d7c3c7f89" providerId="ADAL" clId="{95034E7A-1516-304B-B14C-514392E48D74}" dt="2020-11-12T08:24:09.061" v="3" actId="26606"/>
+          <ac:picMkLst>
+            <pc:docMk/>
+            <pc:sldMk cId="3396157166" sldId="336"/>
+            <ac:picMk id="15" creationId="{2897127E-6CEF-446C-BE87-93B7C46E49D1}"/>
+          </ac:picMkLst>
+        </pc:picChg>
+      </pc:sldChg>
+      <pc:sldChg chg="modSp mod">
+        <pc:chgData name="Teo Xue Jun" userId="0ec9196c-e60d-4330-a032-9d5d7c3c7f89" providerId="ADAL" clId="{95034E7A-1516-304B-B14C-514392E48D74}" dt="2020-11-12T09:12:54.486" v="55" actId="20577"/>
+        <pc:sldMkLst>
+          <pc:docMk/>
+          <pc:sldMk cId="2190382551" sldId="358"/>
+        </pc:sldMkLst>
+        <pc:spChg chg="mod">
+          <ac:chgData name="Teo Xue Jun" userId="0ec9196c-e60d-4330-a032-9d5d7c3c7f89" providerId="ADAL" clId="{95034E7A-1516-304B-B14C-514392E48D74}" dt="2020-11-12T09:12:54.486" v="55" actId="20577"/>
+          <ac:spMkLst>
+            <pc:docMk/>
+            <pc:sldMk cId="2190382551" sldId="358"/>
+            <ac:spMk id="4" creationId="{AD927D75-935F-C94B-93E6-FDEF159122D4}"/>
+          </ac:spMkLst>
+        </pc:spChg>
+      </pc:sldChg>
+    </pc:docChg>
+  </pc:docChgLst>
+  <pc:docChgLst>
+    <pc:chgData name="Teo Xue Jun" userId="0ec9196c-e60d-4330-a032-9d5d7c3c7f89" providerId="ADAL" clId="{25A412C4-30B7-4A40-804D-812B76098C7F}"/>
+    <pc:docChg chg="undo custSel addSld modSld sldOrd modSection">
+      <pc:chgData name="Teo Xue Jun" userId="0ec9196c-e60d-4330-a032-9d5d7c3c7f89" providerId="ADAL" clId="{25A412C4-30B7-4A40-804D-812B76098C7F}" dt="2020-12-01T08:08:49.370" v="27" actId="20577"/>
+      <pc:docMkLst>
+        <pc:docMk/>
+      </pc:docMkLst>
+      <pc:sldChg chg="ord">
+        <pc:chgData name="Teo Xue Jun" userId="0ec9196c-e60d-4330-a032-9d5d7c3c7f89" providerId="ADAL" clId="{25A412C4-30B7-4A40-804D-812B76098C7F}" dt="2020-12-01T08:08:39.429" v="23" actId="20578"/>
+        <pc:sldMkLst>
+          <pc:docMk/>
+          <pc:sldMk cId="4010072076" sldId="283"/>
+        </pc:sldMkLst>
+      </pc:sldChg>
+      <pc:sldChg chg="modSp mod">
+        <pc:chgData name="Teo Xue Jun" userId="0ec9196c-e60d-4330-a032-9d5d7c3c7f89" providerId="ADAL" clId="{25A412C4-30B7-4A40-804D-812B76098C7F}" dt="2020-12-01T08:08:43.786" v="25" actId="20577"/>
+        <pc:sldMkLst>
+          <pc:docMk/>
+          <pc:sldMk cId="924775409" sldId="316"/>
+        </pc:sldMkLst>
+        <pc:spChg chg="mod">
+          <ac:chgData name="Teo Xue Jun" userId="0ec9196c-e60d-4330-a032-9d5d7c3c7f89" providerId="ADAL" clId="{25A412C4-30B7-4A40-804D-812B76098C7F}" dt="2020-12-01T08:08:12.779" v="16" actId="20577"/>
+          <ac:spMkLst>
+            <pc:docMk/>
+            <pc:sldMk cId="924775409" sldId="316"/>
+            <ac:spMk id="2" creationId="{0741C2B4-F697-4C35-BC38-2066FE6C0A83}"/>
+          </ac:spMkLst>
+        </pc:spChg>
+        <pc:spChg chg="mod">
+          <ac:chgData name="Teo Xue Jun" userId="0ec9196c-e60d-4330-a032-9d5d7c3c7f89" providerId="ADAL" clId="{25A412C4-30B7-4A40-804D-812B76098C7F}" dt="2020-12-01T08:08:43.786" v="25" actId="20577"/>
+          <ac:spMkLst>
+            <pc:docMk/>
+            <pc:sldMk cId="924775409" sldId="316"/>
+            <ac:spMk id="4" creationId="{CB5A9CB5-92A4-408D-B92B-18E9B98F063F}"/>
+          </ac:spMkLst>
+        </pc:spChg>
+      </pc:sldChg>
+      <pc:sldChg chg="modSp mod ord">
+        <pc:chgData name="Teo Xue Jun" userId="0ec9196c-e60d-4330-a032-9d5d7c3c7f89" providerId="ADAL" clId="{25A412C4-30B7-4A40-804D-812B76098C7F}" dt="2020-12-01T08:08:49.370" v="27" actId="20577"/>
+        <pc:sldMkLst>
+          <pc:docMk/>
+          <pc:sldMk cId="1527679443" sldId="317"/>
+        </pc:sldMkLst>
+        <pc:spChg chg="mod">
+          <ac:chgData name="Teo Xue Jun" userId="0ec9196c-e60d-4330-a032-9d5d7c3c7f89" providerId="ADAL" clId="{25A412C4-30B7-4A40-804D-812B76098C7F}" dt="2020-12-01T08:08:23.010" v="20" actId="20577"/>
+          <ac:spMkLst>
+            <pc:docMk/>
+            <pc:sldMk cId="1527679443" sldId="317"/>
+            <ac:spMk id="2" creationId="{0741C2B4-F697-4C35-BC38-2066FE6C0A83}"/>
+          </ac:spMkLst>
+        </pc:spChg>
+        <pc:spChg chg="mod">
+          <ac:chgData name="Teo Xue Jun" userId="0ec9196c-e60d-4330-a032-9d5d7c3c7f89" providerId="ADAL" clId="{25A412C4-30B7-4A40-804D-812B76098C7F}" dt="2020-12-01T08:08:49.370" v="27" actId="20577"/>
+          <ac:spMkLst>
+            <pc:docMk/>
+            <pc:sldMk cId="1527679443" sldId="317"/>
+            <ac:spMk id="4" creationId="{CB5A9CB5-92A4-408D-B92B-18E9B98F063F}"/>
+          </ac:spMkLst>
+        </pc:spChg>
+      </pc:sldChg>
+      <pc:sldChg chg="modSp mod">
+        <pc:chgData name="Teo Xue Jun" userId="0ec9196c-e60d-4330-a032-9d5d7c3c7f89" providerId="ADAL" clId="{25A412C4-30B7-4A40-804D-812B76098C7F}" dt="2020-12-01T08:08:18.931" v="18" actId="20577"/>
+        <pc:sldMkLst>
+          <pc:docMk/>
+          <pc:sldMk cId="3242129977" sldId="329"/>
+        </pc:sldMkLst>
+        <pc:spChg chg="mod">
+          <ac:chgData name="Teo Xue Jun" userId="0ec9196c-e60d-4330-a032-9d5d7c3c7f89" providerId="ADAL" clId="{25A412C4-30B7-4A40-804D-812B76098C7F}" dt="2020-12-01T08:08:18.931" v="18" actId="20577"/>
+          <ac:spMkLst>
+            <pc:docMk/>
+            <pc:sldMk cId="3242129977" sldId="329"/>
+            <ac:spMk id="2" creationId="{C8E1A20D-6AA2-FA43-8D24-841163C1076E}"/>
+          </ac:spMkLst>
+        </pc:spChg>
+      </pc:sldChg>
+      <pc:sldChg chg="modSp mod ord">
+        <pc:chgData name="Teo Xue Jun" userId="0ec9196c-e60d-4330-a032-9d5d7c3c7f89" providerId="ADAL" clId="{25A412C4-30B7-4A40-804D-812B76098C7F}" dt="2020-12-01T08:08:39.429" v="23" actId="20578"/>
+        <pc:sldMkLst>
+          <pc:docMk/>
+          <pc:sldMk cId="747540316" sldId="330"/>
+        </pc:sldMkLst>
+        <pc:spChg chg="mod">
+          <ac:chgData name="Teo Xue Jun" userId="0ec9196c-e60d-4330-a032-9d5d7c3c7f89" providerId="ADAL" clId="{25A412C4-30B7-4A40-804D-812B76098C7F}" dt="2020-12-01T08:08:27.825" v="22" actId="20577"/>
+          <ac:spMkLst>
+            <pc:docMk/>
+            <pc:sldMk cId="747540316" sldId="330"/>
+            <ac:spMk id="2" creationId="{C8E1A20D-6AA2-FA43-8D24-841163C1076E}"/>
+          </ac:spMkLst>
+        </pc:spChg>
+      </pc:sldChg>
+      <pc:sldChg chg="addSp modSp new mod">
+        <pc:chgData name="Teo Xue Jun" userId="0ec9196c-e60d-4330-a032-9d5d7c3c7f89" providerId="ADAL" clId="{25A412C4-30B7-4A40-804D-812B76098C7F}" dt="2020-12-01T01:55:30.151" v="12" actId="1076"/>
+        <pc:sldMkLst>
+          <pc:docMk/>
+          <pc:sldMk cId="267374613" sldId="362"/>
+        </pc:sldMkLst>
+        <pc:spChg chg="mod">
+          <ac:chgData name="Teo Xue Jun" userId="0ec9196c-e60d-4330-a032-9d5d7c3c7f89" providerId="ADAL" clId="{25A412C4-30B7-4A40-804D-812B76098C7F}" dt="2020-12-01T01:54:50.725" v="9" actId="20577"/>
+          <ac:spMkLst>
+            <pc:docMk/>
+            <pc:sldMk cId="267374613" sldId="362"/>
+            <ac:spMk id="2" creationId="{74CCF75B-4633-2D42-B3BF-58CA9B6CD65B}"/>
+          </ac:spMkLst>
+        </pc:spChg>
+        <pc:picChg chg="add mod">
+          <ac:chgData name="Teo Xue Jun" userId="0ec9196c-e60d-4330-a032-9d5d7c3c7f89" providerId="ADAL" clId="{25A412C4-30B7-4A40-804D-812B76098C7F}" dt="2020-12-01T01:55:30.151" v="12" actId="1076"/>
+          <ac:picMkLst>
+            <pc:docMk/>
+            <pc:sldMk cId="267374613" sldId="362"/>
+            <ac:picMk id="1026" creationId="{26F4DBDE-C709-6547-A63E-AC474D1C750A}"/>
+          </ac:picMkLst>
+        </pc:picChg>
+      </pc:sldChg>
+    </pc:docChg>
+  </pc:docChgLst>
+  <pc:docChgLst>
     <pc:chgData name="Teo Xue Jun" userId="0ec9196c-e60d-4330-a032-9d5d7c3c7f89" providerId="ADAL" clId="{E3AACE74-3FC8-3645-AC9A-C7747C9C7EE7}"/>
     <pc:docChg chg="undo custSel addSld delSld modSld modSection">
       <pc:chgData name="Teo Xue Jun" userId="0ec9196c-e60d-4330-a032-9d5d7c3c7f89" providerId="ADAL" clId="{E3AACE74-3FC8-3645-AC9A-C7747C9C7EE7}" dt="2021-01-19T03:09:16.677" v="4791" actId="20577"/>
@@ -3416,368 +3778,6 @@
       </pc:sldChg>
     </pc:docChg>
   </pc:docChgLst>
-  <pc:docChgLst>
-    <pc:chgData name="Teo Xue Jun" userId="0ec9196c-e60d-4330-a032-9d5d7c3c7f89" providerId="ADAL" clId="{95034E7A-1516-304B-B14C-514392E48D74}"/>
-    <pc:docChg chg="undo custSel mod modSld">
-      <pc:chgData name="Teo Xue Jun" userId="0ec9196c-e60d-4330-a032-9d5d7c3c7f89" providerId="ADAL" clId="{95034E7A-1516-304B-B14C-514392E48D74}" dt="2020-11-12T09:19:04.949" v="62" actId="20577"/>
-      <pc:docMkLst>
-        <pc:docMk/>
-      </pc:docMkLst>
-      <pc:sldChg chg="addSp modSp mod">
-        <pc:chgData name="Teo Xue Jun" userId="0ec9196c-e60d-4330-a032-9d5d7c3c7f89" providerId="ADAL" clId="{95034E7A-1516-304B-B14C-514392E48D74}" dt="2020-11-12T08:41:27.516" v="22" actId="20577"/>
-        <pc:sldMkLst>
-          <pc:docMk/>
-          <pc:sldMk cId="2178540148" sldId="256"/>
-        </pc:sldMkLst>
-        <pc:spChg chg="mod">
-          <ac:chgData name="Teo Xue Jun" userId="0ec9196c-e60d-4330-a032-9d5d7c3c7f89" providerId="ADAL" clId="{95034E7A-1516-304B-B14C-514392E48D74}" dt="2020-11-12T08:41:27.516" v="22" actId="20577"/>
-          <ac:spMkLst>
-            <pc:docMk/>
-            <pc:sldMk cId="2178540148" sldId="256"/>
-            <ac:spMk id="2" creationId="{84236FC9-365E-462F-8085-8E712936325F}"/>
-          </ac:spMkLst>
-        </pc:spChg>
-        <pc:picChg chg="add mod">
-          <ac:chgData name="Teo Xue Jun" userId="0ec9196c-e60d-4330-a032-9d5d7c3c7f89" providerId="ADAL" clId="{95034E7A-1516-304B-B14C-514392E48D74}" dt="2020-11-12T08:41:22.512" v="13" actId="1076"/>
-          <ac:picMkLst>
-            <pc:docMk/>
-            <pc:sldMk cId="2178540148" sldId="256"/>
-            <ac:picMk id="1026" creationId="{1841AACC-B084-1147-B5EC-7901DE52F7EE}"/>
-          </ac:picMkLst>
-        </pc:picChg>
-      </pc:sldChg>
-      <pc:sldChg chg="addSp delSp modSp mod setBg">
-        <pc:chgData name="Teo Xue Jun" userId="0ec9196c-e60d-4330-a032-9d5d7c3c7f89" providerId="ADAL" clId="{95034E7A-1516-304B-B14C-514392E48D74}" dt="2020-11-12T09:13:50.698" v="61"/>
-        <pc:sldMkLst>
-          <pc:docMk/>
-          <pc:sldMk cId="1217361202" sldId="257"/>
-        </pc:sldMkLst>
-        <pc:spChg chg="mod">
-          <ac:chgData name="Teo Xue Jun" userId="0ec9196c-e60d-4330-a032-9d5d7c3c7f89" providerId="ADAL" clId="{95034E7A-1516-304B-B14C-514392E48D74}" dt="2020-11-12T08:25:23.735" v="5" actId="26606"/>
-          <ac:spMkLst>
-            <pc:docMk/>
-            <pc:sldMk cId="1217361202" sldId="257"/>
-            <ac:spMk id="2" creationId="{5FD818B8-89A2-47A5-85EC-9ED1B9B407D4}"/>
-          </ac:spMkLst>
-        </pc:spChg>
-        <pc:spChg chg="mod">
-          <ac:chgData name="Teo Xue Jun" userId="0ec9196c-e60d-4330-a032-9d5d7c3c7f89" providerId="ADAL" clId="{95034E7A-1516-304B-B14C-514392E48D74}" dt="2020-11-12T09:13:50.698" v="61"/>
-          <ac:spMkLst>
-            <pc:docMk/>
-            <pc:sldMk cId="1217361202" sldId="257"/>
-            <ac:spMk id="4" creationId="{375B1118-F33A-44AC-8111-C1DF893BB056}"/>
-          </ac:spMkLst>
-        </pc:spChg>
-        <pc:spChg chg="add del">
-          <ac:chgData name="Teo Xue Jun" userId="0ec9196c-e60d-4330-a032-9d5d7c3c7f89" providerId="ADAL" clId="{95034E7A-1516-304B-B14C-514392E48D74}" dt="2020-11-12T08:25:23.735" v="5" actId="26606"/>
-          <ac:spMkLst>
-            <pc:docMk/>
-            <pc:sldMk cId="1217361202" sldId="257"/>
-            <ac:spMk id="9" creationId="{64F519EA-836C-4E21-87EE-CE7AB018636F}"/>
-          </ac:spMkLst>
-        </pc:spChg>
-        <pc:spChg chg="add del">
-          <ac:chgData name="Teo Xue Jun" userId="0ec9196c-e60d-4330-a032-9d5d7c3c7f89" providerId="ADAL" clId="{95034E7A-1516-304B-B14C-514392E48D74}" dt="2020-11-12T08:25:23.735" v="5" actId="26606"/>
-          <ac:spMkLst>
-            <pc:docMk/>
-            <pc:sldMk cId="1217361202" sldId="257"/>
-            <ac:spMk id="11" creationId="{E3E51905-F374-4E1A-97CF-B741584B74D5}"/>
-          </ac:spMkLst>
-        </pc:spChg>
-        <pc:spChg chg="add del">
-          <ac:chgData name="Teo Xue Jun" userId="0ec9196c-e60d-4330-a032-9d5d7c3c7f89" providerId="ADAL" clId="{95034E7A-1516-304B-B14C-514392E48D74}" dt="2020-11-12T08:25:23.735" v="5" actId="26606"/>
-          <ac:spMkLst>
-            <pc:docMk/>
-            <pc:sldMk cId="1217361202" sldId="257"/>
-            <ac:spMk id="13" creationId="{A210685A-6235-45A7-850D-A6F555466EF7}"/>
-          </ac:spMkLst>
-        </pc:spChg>
-        <pc:grpChg chg="add del">
-          <ac:chgData name="Teo Xue Jun" userId="0ec9196c-e60d-4330-a032-9d5d7c3c7f89" providerId="ADAL" clId="{95034E7A-1516-304B-B14C-514392E48D74}" dt="2020-11-12T08:25:23.735" v="5" actId="26606"/>
-          <ac:grpSpMkLst>
-            <pc:docMk/>
-            <pc:sldMk cId="1217361202" sldId="257"/>
-            <ac:grpSpMk id="15" creationId="{C833A70A-9722-46F0-A5EB-C72F78747079}"/>
-          </ac:grpSpMkLst>
-        </pc:grpChg>
-      </pc:sldChg>
-      <pc:sldChg chg="addSp delSp modSp">
-        <pc:chgData name="Teo Xue Jun" userId="0ec9196c-e60d-4330-a032-9d5d7c3c7f89" providerId="ADAL" clId="{95034E7A-1516-304B-B14C-514392E48D74}" dt="2020-11-12T09:13:41.430" v="60"/>
-        <pc:sldMkLst>
-          <pc:docMk/>
-          <pc:sldMk cId="3034473221" sldId="280"/>
-        </pc:sldMkLst>
-        <pc:spChg chg="add del mod">
-          <ac:chgData name="Teo Xue Jun" userId="0ec9196c-e60d-4330-a032-9d5d7c3c7f89" providerId="ADAL" clId="{95034E7A-1516-304B-B14C-514392E48D74}" dt="2020-11-12T09:13:41.430" v="60"/>
-          <ac:spMkLst>
-            <pc:docMk/>
-            <pc:sldMk cId="3034473221" sldId="280"/>
-            <ac:spMk id="2" creationId="{EB9F3863-7F5E-46D8-AC2D-A99C2A516C6E}"/>
-          </ac:spMkLst>
-        </pc:spChg>
-        <pc:spChg chg="add del mod">
-          <ac:chgData name="Teo Xue Jun" userId="0ec9196c-e60d-4330-a032-9d5d7c3c7f89" providerId="ADAL" clId="{95034E7A-1516-304B-B14C-514392E48D74}" dt="2020-11-12T09:13:27.575" v="58" actId="478"/>
-          <ac:spMkLst>
-            <pc:docMk/>
-            <pc:sldMk cId="3034473221" sldId="280"/>
-            <ac:spMk id="4" creationId="{480EFBA1-2BBF-A548-A6D5-690C0BB35911}"/>
-          </ac:spMkLst>
-        </pc:spChg>
-        <pc:picChg chg="add del">
-          <ac:chgData name="Teo Xue Jun" userId="0ec9196c-e60d-4330-a032-9d5d7c3c7f89" providerId="ADAL" clId="{95034E7A-1516-304B-B14C-514392E48D74}" dt="2020-11-12T09:13:28.640" v="59"/>
-          <ac:picMkLst>
-            <pc:docMk/>
-            <pc:sldMk cId="3034473221" sldId="280"/>
-            <ac:picMk id="2050" creationId="{D3454D65-526B-DB49-933D-D9347192B6E2}"/>
-          </ac:picMkLst>
-        </pc:picChg>
-      </pc:sldChg>
-      <pc:sldChg chg="addSp delSp modSp mod">
-        <pc:chgData name="Teo Xue Jun" userId="0ec9196c-e60d-4330-a032-9d5d7c3c7f89" providerId="ADAL" clId="{95034E7A-1516-304B-B14C-514392E48D74}" dt="2020-11-12T08:23:28.802" v="2" actId="26606"/>
-        <pc:sldMkLst>
-          <pc:docMk/>
-          <pc:sldMk cId="3528580822" sldId="297"/>
-        </pc:sldMkLst>
-        <pc:spChg chg="mod">
-          <ac:chgData name="Teo Xue Jun" userId="0ec9196c-e60d-4330-a032-9d5d7c3c7f89" providerId="ADAL" clId="{95034E7A-1516-304B-B14C-514392E48D74}" dt="2020-11-12T08:23:28.802" v="2" actId="26606"/>
-          <ac:spMkLst>
-            <pc:docMk/>
-            <pc:sldMk cId="3528580822" sldId="297"/>
-            <ac:spMk id="2" creationId="{4537F50B-F516-4FC8-A1E3-DC1D32D16468}"/>
-          </ac:spMkLst>
-        </pc:spChg>
-        <pc:spChg chg="mod">
-          <ac:chgData name="Teo Xue Jun" userId="0ec9196c-e60d-4330-a032-9d5d7c3c7f89" providerId="ADAL" clId="{95034E7A-1516-304B-B14C-514392E48D74}" dt="2020-11-12T08:23:28.802" v="2" actId="26606"/>
-          <ac:spMkLst>
-            <pc:docMk/>
-            <pc:sldMk cId="3528580822" sldId="297"/>
-            <ac:spMk id="3" creationId="{33D062B1-9B50-4616-B051-D0EC2856372F}"/>
-          </ac:spMkLst>
-        </pc:spChg>
-        <pc:spChg chg="del">
-          <ac:chgData name="Teo Xue Jun" userId="0ec9196c-e60d-4330-a032-9d5d7c3c7f89" providerId="ADAL" clId="{95034E7A-1516-304B-B14C-514392E48D74}" dt="2020-11-12T08:22:52.016" v="0" actId="26606"/>
-          <ac:spMkLst>
-            <pc:docMk/>
-            <pc:sldMk cId="3528580822" sldId="297"/>
-            <ac:spMk id="8" creationId="{3B854194-185D-494D-905C-7C7CB2E30F6E}"/>
-          </ac:spMkLst>
-        </pc:spChg>
-        <pc:spChg chg="del">
-          <ac:chgData name="Teo Xue Jun" userId="0ec9196c-e60d-4330-a032-9d5d7c3c7f89" providerId="ADAL" clId="{95034E7A-1516-304B-B14C-514392E48D74}" dt="2020-11-12T08:22:52.016" v="0" actId="26606"/>
-          <ac:spMkLst>
-            <pc:docMk/>
-            <pc:sldMk cId="3528580822" sldId="297"/>
-            <ac:spMk id="10" creationId="{B4F5FA0D-0104-4987-8241-EFF7C85B88DE}"/>
-          </ac:spMkLst>
-        </pc:spChg>
-        <pc:spChg chg="add del">
-          <ac:chgData name="Teo Xue Jun" userId="0ec9196c-e60d-4330-a032-9d5d7c3c7f89" providerId="ADAL" clId="{95034E7A-1516-304B-B14C-514392E48D74}" dt="2020-11-12T08:23:15.967" v="1" actId="26606"/>
-          <ac:spMkLst>
-            <pc:docMk/>
-            <pc:sldMk cId="3528580822" sldId="297"/>
-            <ac:spMk id="17" creationId="{081EA652-8C6A-4E69-BEB9-170809474553}"/>
-          </ac:spMkLst>
-        </pc:spChg>
-        <pc:spChg chg="add del">
-          <ac:chgData name="Teo Xue Jun" userId="0ec9196c-e60d-4330-a032-9d5d7c3c7f89" providerId="ADAL" clId="{95034E7A-1516-304B-B14C-514392E48D74}" dt="2020-11-12T08:23:15.967" v="1" actId="26606"/>
-          <ac:spMkLst>
-            <pc:docMk/>
-            <pc:sldMk cId="3528580822" sldId="297"/>
-            <ac:spMk id="19" creationId="{5298780A-33B9-4EA2-8F67-DE68AD62841B}"/>
-          </ac:spMkLst>
-        </pc:spChg>
-        <pc:spChg chg="add del">
-          <ac:chgData name="Teo Xue Jun" userId="0ec9196c-e60d-4330-a032-9d5d7c3c7f89" providerId="ADAL" clId="{95034E7A-1516-304B-B14C-514392E48D74}" dt="2020-11-12T08:23:15.967" v="1" actId="26606"/>
-          <ac:spMkLst>
-            <pc:docMk/>
-            <pc:sldMk cId="3528580822" sldId="297"/>
-            <ac:spMk id="21" creationId="{7F488E8B-4E1E-4402-8935-D4E6C02615C7}"/>
-          </ac:spMkLst>
-        </pc:spChg>
-        <pc:spChg chg="add del">
-          <ac:chgData name="Teo Xue Jun" userId="0ec9196c-e60d-4330-a032-9d5d7c3c7f89" providerId="ADAL" clId="{95034E7A-1516-304B-B14C-514392E48D74}" dt="2020-11-12T08:23:28.802" v="2" actId="26606"/>
-          <ac:spMkLst>
-            <pc:docMk/>
-            <pc:sldMk cId="3528580822" sldId="297"/>
-            <ac:spMk id="28" creationId="{18873D23-2DCF-4B31-A009-95721C06E8E1}"/>
-          </ac:spMkLst>
-        </pc:spChg>
-        <pc:spChg chg="add del">
-          <ac:chgData name="Teo Xue Jun" userId="0ec9196c-e60d-4330-a032-9d5d7c3c7f89" providerId="ADAL" clId="{95034E7A-1516-304B-B14C-514392E48D74}" dt="2020-11-12T08:23:28.802" v="2" actId="26606"/>
-          <ac:spMkLst>
-            <pc:docMk/>
-            <pc:sldMk cId="3528580822" sldId="297"/>
-            <ac:spMk id="30" creationId="{C13EF075-D4EF-4929-ADBC-91B27DA19955}"/>
-          </ac:spMkLst>
-        </pc:spChg>
-        <pc:spChg chg="add">
-          <ac:chgData name="Teo Xue Jun" userId="0ec9196c-e60d-4330-a032-9d5d7c3c7f89" providerId="ADAL" clId="{95034E7A-1516-304B-B14C-514392E48D74}" dt="2020-11-12T08:23:28.802" v="2" actId="26606"/>
-          <ac:spMkLst>
-            <pc:docMk/>
-            <pc:sldMk cId="3528580822" sldId="297"/>
-            <ac:spMk id="41" creationId="{64F519EA-836C-4E21-87EE-CE7AB018636F}"/>
-          </ac:spMkLst>
-        </pc:spChg>
-        <pc:spChg chg="add">
-          <ac:chgData name="Teo Xue Jun" userId="0ec9196c-e60d-4330-a032-9d5d7c3c7f89" providerId="ADAL" clId="{95034E7A-1516-304B-B14C-514392E48D74}" dt="2020-11-12T08:23:28.802" v="2" actId="26606"/>
-          <ac:spMkLst>
-            <pc:docMk/>
-            <pc:sldMk cId="3528580822" sldId="297"/>
-            <ac:spMk id="43" creationId="{E3E51905-F374-4E1A-97CF-B741584B74D5}"/>
-          </ac:spMkLst>
-        </pc:spChg>
-        <pc:spChg chg="add">
-          <ac:chgData name="Teo Xue Jun" userId="0ec9196c-e60d-4330-a032-9d5d7c3c7f89" providerId="ADAL" clId="{95034E7A-1516-304B-B14C-514392E48D74}" dt="2020-11-12T08:23:28.802" v="2" actId="26606"/>
-          <ac:spMkLst>
-            <pc:docMk/>
-            <pc:sldMk cId="3528580822" sldId="297"/>
-            <ac:spMk id="45" creationId="{A210685A-6235-45A7-850D-A6F555466EF7}"/>
-          </ac:spMkLst>
-        </pc:spChg>
-        <pc:grpChg chg="add del">
-          <ac:chgData name="Teo Xue Jun" userId="0ec9196c-e60d-4330-a032-9d5d7c3c7f89" providerId="ADAL" clId="{95034E7A-1516-304B-B14C-514392E48D74}" dt="2020-11-12T08:23:28.802" v="2" actId="26606"/>
-          <ac:grpSpMkLst>
-            <pc:docMk/>
-            <pc:sldMk cId="3528580822" sldId="297"/>
-            <ac:grpSpMk id="32" creationId="{DAA26DFA-AAB2-4973-9C17-16D587C7B198}"/>
-          </ac:grpSpMkLst>
-        </pc:grpChg>
-        <pc:grpChg chg="add">
-          <ac:chgData name="Teo Xue Jun" userId="0ec9196c-e60d-4330-a032-9d5d7c3c7f89" providerId="ADAL" clId="{95034E7A-1516-304B-B14C-514392E48D74}" dt="2020-11-12T08:23:28.802" v="2" actId="26606"/>
-          <ac:grpSpMkLst>
-            <pc:docMk/>
-            <pc:sldMk cId="3528580822" sldId="297"/>
-            <ac:grpSpMk id="47" creationId="{C833A70A-9722-46F0-A5EB-C72F78747079}"/>
-          </ac:grpSpMkLst>
-        </pc:grpChg>
-        <pc:picChg chg="del">
-          <ac:chgData name="Teo Xue Jun" userId="0ec9196c-e60d-4330-a032-9d5d7c3c7f89" providerId="ADAL" clId="{95034E7A-1516-304B-B14C-514392E48D74}" dt="2020-11-12T08:22:52.016" v="0" actId="26606"/>
-          <ac:picMkLst>
-            <pc:docMk/>
-            <pc:sldMk cId="3528580822" sldId="297"/>
-            <ac:picMk id="12" creationId="{2897127E-6CEF-446C-BE87-93B7C46E49D1}"/>
-          </ac:picMkLst>
-        </pc:picChg>
-        <pc:cxnChg chg="add del">
-          <ac:chgData name="Teo Xue Jun" userId="0ec9196c-e60d-4330-a032-9d5d7c3c7f89" providerId="ADAL" clId="{95034E7A-1516-304B-B14C-514392E48D74}" dt="2020-11-12T08:23:15.967" v="1" actId="26606"/>
-          <ac:cxnSpMkLst>
-            <pc:docMk/>
-            <pc:sldMk cId="3528580822" sldId="297"/>
-            <ac:cxnSpMk id="23" creationId="{23AAC9B5-8015-485C-ACF9-A750390E9A56}"/>
-          </ac:cxnSpMkLst>
-        </pc:cxnChg>
-      </pc:sldChg>
-      <pc:sldChg chg="modSp mod">
-        <pc:chgData name="Teo Xue Jun" userId="0ec9196c-e60d-4330-a032-9d5d7c3c7f89" providerId="ADAL" clId="{95034E7A-1516-304B-B14C-514392E48D74}" dt="2020-11-12T08:47:44.663" v="35" actId="20577"/>
-        <pc:sldMkLst>
-          <pc:docMk/>
-          <pc:sldMk cId="4193163313" sldId="304"/>
-        </pc:sldMkLst>
-        <pc:spChg chg="mod">
-          <ac:chgData name="Teo Xue Jun" userId="0ec9196c-e60d-4330-a032-9d5d7c3c7f89" providerId="ADAL" clId="{95034E7A-1516-304B-B14C-514392E48D74}" dt="2020-11-12T08:47:44.663" v="35" actId="20577"/>
-          <ac:spMkLst>
-            <pc:docMk/>
-            <pc:sldMk cId="4193163313" sldId="304"/>
-            <ac:spMk id="3" creationId="{BA9DD1DD-8ECD-4C1D-9B6C-119D81E86128}"/>
-          </ac:spMkLst>
-        </pc:spChg>
-      </pc:sldChg>
-      <pc:sldChg chg="addSp delSp modSp mod">
-        <pc:chgData name="Teo Xue Jun" userId="0ec9196c-e60d-4330-a032-9d5d7c3c7f89" providerId="ADAL" clId="{95034E7A-1516-304B-B14C-514392E48D74}" dt="2020-11-12T09:19:04.949" v="62" actId="20577"/>
-        <pc:sldMkLst>
-          <pc:docMk/>
-          <pc:sldMk cId="3396157166" sldId="336"/>
-        </pc:sldMkLst>
-        <pc:spChg chg="mod">
-          <ac:chgData name="Teo Xue Jun" userId="0ec9196c-e60d-4330-a032-9d5d7c3c7f89" providerId="ADAL" clId="{95034E7A-1516-304B-B14C-514392E48D74}" dt="2020-11-12T08:24:09.061" v="3" actId="26606"/>
-          <ac:spMkLst>
-            <pc:docMk/>
-            <pc:sldMk cId="3396157166" sldId="336"/>
-            <ac:spMk id="5" creationId="{89F32E64-544A-0645-860C-0EB961438F20}"/>
-          </ac:spMkLst>
-        </pc:spChg>
-        <pc:spChg chg="mod">
-          <ac:chgData name="Teo Xue Jun" userId="0ec9196c-e60d-4330-a032-9d5d7c3c7f89" providerId="ADAL" clId="{95034E7A-1516-304B-B14C-514392E48D74}" dt="2020-11-12T09:19:04.949" v="62" actId="20577"/>
-          <ac:spMkLst>
-            <pc:docMk/>
-            <pc:sldMk cId="3396157166" sldId="336"/>
-            <ac:spMk id="6" creationId="{98EFFE90-BA0D-F440-8E15-5C9FBAB49DDC}"/>
-          </ac:spMkLst>
-        </pc:spChg>
-        <pc:spChg chg="del">
-          <ac:chgData name="Teo Xue Jun" userId="0ec9196c-e60d-4330-a032-9d5d7c3c7f89" providerId="ADAL" clId="{95034E7A-1516-304B-B14C-514392E48D74}" dt="2020-11-12T08:24:09.061" v="3" actId="26606"/>
-          <ac:spMkLst>
-            <pc:docMk/>
-            <pc:sldMk cId="3396157166" sldId="336"/>
-            <ac:spMk id="11" creationId="{3B854194-185D-494D-905C-7C7CB2E30F6E}"/>
-          </ac:spMkLst>
-        </pc:spChg>
-        <pc:spChg chg="del">
-          <ac:chgData name="Teo Xue Jun" userId="0ec9196c-e60d-4330-a032-9d5d7c3c7f89" providerId="ADAL" clId="{95034E7A-1516-304B-B14C-514392E48D74}" dt="2020-11-12T08:24:09.061" v="3" actId="26606"/>
-          <ac:spMkLst>
-            <pc:docMk/>
-            <pc:sldMk cId="3396157166" sldId="336"/>
-            <ac:spMk id="13" creationId="{B4F5FA0D-0104-4987-8241-EFF7C85B88DE}"/>
-          </ac:spMkLst>
-        </pc:spChg>
-        <pc:spChg chg="add">
-          <ac:chgData name="Teo Xue Jun" userId="0ec9196c-e60d-4330-a032-9d5d7c3c7f89" providerId="ADAL" clId="{95034E7A-1516-304B-B14C-514392E48D74}" dt="2020-11-12T08:24:09.061" v="3" actId="26606"/>
-          <ac:spMkLst>
-            <pc:docMk/>
-            <pc:sldMk cId="3396157166" sldId="336"/>
-            <ac:spMk id="20" creationId="{64F519EA-836C-4E21-87EE-CE7AB018636F}"/>
-          </ac:spMkLst>
-        </pc:spChg>
-        <pc:spChg chg="add">
-          <ac:chgData name="Teo Xue Jun" userId="0ec9196c-e60d-4330-a032-9d5d7c3c7f89" providerId="ADAL" clId="{95034E7A-1516-304B-B14C-514392E48D74}" dt="2020-11-12T08:24:09.061" v="3" actId="26606"/>
-          <ac:spMkLst>
-            <pc:docMk/>
-            <pc:sldMk cId="3396157166" sldId="336"/>
-            <ac:spMk id="22" creationId="{E3E51905-F374-4E1A-97CF-B741584B74D5}"/>
-          </ac:spMkLst>
-        </pc:spChg>
-        <pc:spChg chg="add">
-          <ac:chgData name="Teo Xue Jun" userId="0ec9196c-e60d-4330-a032-9d5d7c3c7f89" providerId="ADAL" clId="{95034E7A-1516-304B-B14C-514392E48D74}" dt="2020-11-12T08:24:09.061" v="3" actId="26606"/>
-          <ac:spMkLst>
-            <pc:docMk/>
-            <pc:sldMk cId="3396157166" sldId="336"/>
-            <ac:spMk id="24" creationId="{A210685A-6235-45A7-850D-A6F555466EF7}"/>
-          </ac:spMkLst>
-        </pc:spChg>
-        <pc:grpChg chg="add">
-          <ac:chgData name="Teo Xue Jun" userId="0ec9196c-e60d-4330-a032-9d5d7c3c7f89" providerId="ADAL" clId="{95034E7A-1516-304B-B14C-514392E48D74}" dt="2020-11-12T08:24:09.061" v="3" actId="26606"/>
-          <ac:grpSpMkLst>
-            <pc:docMk/>
-            <pc:sldMk cId="3396157166" sldId="336"/>
-            <ac:grpSpMk id="26" creationId="{C833A70A-9722-46F0-A5EB-C72F78747079}"/>
-          </ac:grpSpMkLst>
-        </pc:grpChg>
-        <pc:picChg chg="del">
-          <ac:chgData name="Teo Xue Jun" userId="0ec9196c-e60d-4330-a032-9d5d7c3c7f89" providerId="ADAL" clId="{95034E7A-1516-304B-B14C-514392E48D74}" dt="2020-11-12T08:24:09.061" v="3" actId="26606"/>
-          <ac:picMkLst>
-            <pc:docMk/>
-            <pc:sldMk cId="3396157166" sldId="336"/>
-            <ac:picMk id="15" creationId="{2897127E-6CEF-446C-BE87-93B7C46E49D1}"/>
-          </ac:picMkLst>
-        </pc:picChg>
-      </pc:sldChg>
-      <pc:sldChg chg="modSp mod">
-        <pc:chgData name="Teo Xue Jun" userId="0ec9196c-e60d-4330-a032-9d5d7c3c7f89" providerId="ADAL" clId="{95034E7A-1516-304B-B14C-514392E48D74}" dt="2020-11-12T09:12:54.486" v="55" actId="20577"/>
-        <pc:sldMkLst>
-          <pc:docMk/>
-          <pc:sldMk cId="2190382551" sldId="358"/>
-        </pc:sldMkLst>
-        <pc:spChg chg="mod">
-          <ac:chgData name="Teo Xue Jun" userId="0ec9196c-e60d-4330-a032-9d5d7c3c7f89" providerId="ADAL" clId="{95034E7A-1516-304B-B14C-514392E48D74}" dt="2020-11-12T09:12:54.486" v="55" actId="20577"/>
-          <ac:spMkLst>
-            <pc:docMk/>
-            <pc:sldMk cId="2190382551" sldId="358"/>
-            <ac:spMk id="4" creationId="{AD927D75-935F-C94B-93E6-FDEF159122D4}"/>
-          </ac:spMkLst>
-        </pc:spChg>
-      </pc:sldChg>
-    </pc:docChg>
-  </pc:docChgLst>
 </pc:chgInfo>
 </file>
 
@@ -4090,7 +4090,7 @@
           <a:p>
             <a:fld id="{0BE32527-357E-F245-B9F3-C76AC4E00D6A}" type="datetimeFigureOut">
               <a:rPr lang="en-US" smtClean="0"/>
-              <a:t>1/19/21</a:t>
+              <a:t>2/26/21</a:t>
             </a:fld>
             <a:endParaRPr lang="en-US"/>
           </a:p>
@@ -4678,7 +4678,7 @@
           <a:p>
             <a:fld id="{C4AF4ACE-F4ED-4535-87BC-8440E49EC22F}" type="datetimeFigureOut">
               <a:rPr lang="en-SG" smtClean="0"/>
-              <a:t>19/1/21</a:t>
+              <a:t>26/2/21</a:t>
             </a:fld>
             <a:endParaRPr lang="en-SG"/>
           </a:p>
@@ -4878,7 +4878,7 @@
           <a:p>
             <a:fld id="{C4AF4ACE-F4ED-4535-87BC-8440E49EC22F}" type="datetimeFigureOut">
               <a:rPr lang="en-SG" smtClean="0"/>
-              <a:t>19/1/21</a:t>
+              <a:t>26/2/21</a:t>
             </a:fld>
             <a:endParaRPr lang="en-SG"/>
           </a:p>
@@ -5088,7 +5088,7 @@
           <a:p>
             <a:fld id="{C4AF4ACE-F4ED-4535-87BC-8440E49EC22F}" type="datetimeFigureOut">
               <a:rPr lang="en-SG" smtClean="0"/>
-              <a:t>19/1/21</a:t>
+              <a:t>26/2/21</a:t>
             </a:fld>
             <a:endParaRPr lang="en-SG"/>
           </a:p>
@@ -5288,7 +5288,7 @@
           <a:p>
             <a:fld id="{C4AF4ACE-F4ED-4535-87BC-8440E49EC22F}" type="datetimeFigureOut">
               <a:rPr lang="en-SG" smtClean="0"/>
-              <a:t>19/1/21</a:t>
+              <a:t>26/2/21</a:t>
             </a:fld>
             <a:endParaRPr lang="en-SG"/>
           </a:p>
@@ -5564,7 +5564,7 @@
           <a:p>
             <a:fld id="{C4AF4ACE-F4ED-4535-87BC-8440E49EC22F}" type="datetimeFigureOut">
               <a:rPr lang="en-SG" smtClean="0"/>
-              <a:t>19/1/21</a:t>
+              <a:t>26/2/21</a:t>
             </a:fld>
             <a:endParaRPr lang="en-SG"/>
           </a:p>
@@ -5832,7 +5832,7 @@
           <a:p>
             <a:fld id="{C4AF4ACE-F4ED-4535-87BC-8440E49EC22F}" type="datetimeFigureOut">
               <a:rPr lang="en-SG" smtClean="0"/>
-              <a:t>19/1/21</a:t>
+              <a:t>26/2/21</a:t>
             </a:fld>
             <a:endParaRPr lang="en-SG"/>
           </a:p>
@@ -6247,7 +6247,7 @@
           <a:p>
             <a:fld id="{C4AF4ACE-F4ED-4535-87BC-8440E49EC22F}" type="datetimeFigureOut">
               <a:rPr lang="en-SG" smtClean="0"/>
-              <a:t>19/1/21</a:t>
+              <a:t>26/2/21</a:t>
             </a:fld>
             <a:endParaRPr lang="en-SG"/>
           </a:p>
@@ -6389,7 +6389,7 @@
           <a:p>
             <a:fld id="{C4AF4ACE-F4ED-4535-87BC-8440E49EC22F}" type="datetimeFigureOut">
               <a:rPr lang="en-SG" smtClean="0"/>
-              <a:t>19/1/21</a:t>
+              <a:t>26/2/21</a:t>
             </a:fld>
             <a:endParaRPr lang="en-SG"/>
           </a:p>
@@ -6502,7 +6502,7 @@
           <a:p>
             <a:fld id="{C4AF4ACE-F4ED-4535-87BC-8440E49EC22F}" type="datetimeFigureOut">
               <a:rPr lang="en-SG" smtClean="0"/>
-              <a:t>19/1/21</a:t>
+              <a:t>26/2/21</a:t>
             </a:fld>
             <a:endParaRPr lang="en-SG"/>
           </a:p>
@@ -6815,7 +6815,7 @@
           <a:p>
             <a:fld id="{C4AF4ACE-F4ED-4535-87BC-8440E49EC22F}" type="datetimeFigureOut">
               <a:rPr lang="en-SG" smtClean="0"/>
-              <a:t>19/1/21</a:t>
+              <a:t>26/2/21</a:t>
             </a:fld>
             <a:endParaRPr lang="en-SG"/>
           </a:p>
@@ -7104,7 +7104,7 @@
           <a:p>
             <a:fld id="{C4AF4ACE-F4ED-4535-87BC-8440E49EC22F}" type="datetimeFigureOut">
               <a:rPr lang="en-SG" smtClean="0"/>
-              <a:t>19/1/21</a:t>
+              <a:t>26/2/21</a:t>
             </a:fld>
             <a:endParaRPr lang="en-SG"/>
           </a:p>
@@ -7347,7 +7347,7 @@
           <a:p>
             <a:fld id="{C4AF4ACE-F4ED-4535-87BC-8440E49EC22F}" type="datetimeFigureOut">
               <a:rPr lang="en-SG" smtClean="0"/>
-              <a:t>19/1/21</a:t>
+              <a:t>26/2/21</a:t>
             </a:fld>
             <a:endParaRPr lang="en-SG"/>
           </a:p>
@@ -16216,7 +16216,7 @@
           <p:cNvPr id="2" name="Title 1">
             <a:extLst>
               <a:ext uri="{FF2B5EF4-FFF2-40B4-BE49-F238E27FC236}">
-                <a16:creationId xmlns:a16="http://schemas.microsoft.com/office/drawing/2014/main" id="{5FD818B8-89A2-47A5-85EC-9ED1B9B407D4}"/>
+                <a16:creationId xmlns:a16="http://schemas.microsoft.com/office/drawing/2014/main" id="{FD9F4581-636C-864E-8C77-C9EC101A1FCE}"/>
               </a:ext>
             </a:extLst>
           </p:cNvPr>
@@ -16227,112 +16227,478 @@
             <p:ph type="title"/>
           </p:nvPr>
         </p:nvSpPr>
-        <p:spPr>
-          <a:xfrm>
-            <a:off x="839788" y="2055183"/>
-            <a:ext cx="3932237" cy="1600200"/>
-          </a:xfrm>
-        </p:spPr>
+        <p:spPr/>
         <p:txBody>
           <a:bodyPr/>
           <a:lstStyle/>
           <a:p>
             <a:r>
-              <a:rPr lang="en-SG" sz="4400"/>
-              <a:t>Contents</a:t>
-            </a:r>
-            <a:endParaRPr lang="en-SG" dirty="0"/>
+              <a:rPr lang="en-US" dirty="0"/>
+              <a:t>Workshop Schedule</a:t>
+            </a:r>
           </a:p>
         </p:txBody>
       </p:sp>
-      <p:sp>
-        <p:nvSpPr>
-          <p:cNvPr id="4" name="Content Placeholder 3">
-            <a:extLst>
-              <a:ext uri="{FF2B5EF4-FFF2-40B4-BE49-F238E27FC236}">
-                <a16:creationId xmlns:a16="http://schemas.microsoft.com/office/drawing/2014/main" id="{375B1118-F33A-44AC-8111-C1DF893BB056}"/>
-              </a:ext>
-            </a:extLst>
-          </p:cNvPr>
-          <p:cNvSpPr>
-            <a:spLocks noGrp="1"/>
-          </p:cNvSpPr>
+      <p:graphicFrame>
+        <p:nvGraphicFramePr>
+          <p:cNvPr id="5" name="Table 5">
+            <a:extLst>
+              <a:ext uri="{FF2B5EF4-FFF2-40B4-BE49-F238E27FC236}">
+                <a16:creationId xmlns:a16="http://schemas.microsoft.com/office/drawing/2014/main" id="{97E28537-F41C-BB46-97C0-2FAE48687F11}"/>
+              </a:ext>
+            </a:extLst>
+          </p:cNvPr>
+          <p:cNvGraphicFramePr>
+            <a:graphicFrameLocks noGrp="1"/>
+          </p:cNvGraphicFramePr>
           <p:nvPr>
             <p:ph idx="1"/>
+            <p:extLst>
+              <p:ext uri="{D42A27DB-BD31-4B8C-83A1-F6EECF244321}">
+                <p14:modId xmlns:p14="http://schemas.microsoft.com/office/powerpoint/2010/main" val="3918250622"/>
+              </p:ext>
+            </p:extLst>
           </p:nvPr>
-        </p:nvSpPr>
-        <p:spPr/>
-        <p:txBody>
-          <a:bodyPr>
-            <a:normAutofit/>
-          </a:bodyPr>
-          <a:lstStyle/>
-          <a:p>
-            <a:pPr marL="514350" indent="-514350">
-              <a:buFont typeface="+mj-lt"/>
-              <a:buAutoNum type="arabicPeriod"/>
-            </a:pPr>
-            <a:r>
-              <a:rPr lang="en-SG" dirty="0"/>
-              <a:t>Introduction</a:t>
-            </a:r>
-          </a:p>
-          <a:p>
-            <a:pPr marL="514350" indent="-514350">
-              <a:buFont typeface="+mj-lt"/>
-              <a:buAutoNum type="arabicPeriod"/>
-            </a:pPr>
-            <a:r>
-              <a:rPr lang="en-SG" dirty="0"/>
-              <a:t>What is Data Privacy?</a:t>
-            </a:r>
-          </a:p>
-          <a:p>
-            <a:pPr marL="514350" indent="-514350">
-              <a:buFont typeface="+mj-lt"/>
-              <a:buAutoNum type="arabicPeriod"/>
-            </a:pPr>
-            <a:r>
-              <a:rPr lang="en-SG" dirty="0"/>
-              <a:t>PII vs Personal Data</a:t>
-            </a:r>
-          </a:p>
-          <a:p>
-            <a:pPr marL="514350" indent="-514350">
-              <a:buFont typeface="+mj-lt"/>
-              <a:buAutoNum type="arabicPeriod"/>
-            </a:pPr>
-            <a:r>
-              <a:rPr lang="en-SG" dirty="0"/>
-              <a:t>Data Privacy Regulations</a:t>
-            </a:r>
-          </a:p>
-          <a:p>
-            <a:pPr marL="514350" indent="-514350">
-              <a:buFont typeface="+mj-lt"/>
-              <a:buAutoNum type="arabicPeriod"/>
-            </a:pPr>
-            <a:r>
-              <a:rPr lang="en-SG" dirty="0"/>
-              <a:t>PSDSRC and its recommendations</a:t>
-            </a:r>
-          </a:p>
-          <a:p>
-            <a:pPr marL="514350" indent="-514350">
-              <a:buFont typeface="+mj-lt"/>
-              <a:buAutoNum type="arabicPeriod"/>
-            </a:pPr>
-            <a:r>
-              <a:rPr lang="en-SG" dirty="0"/>
-              <a:t>Data Anonymization Concepts and Methods</a:t>
-            </a:r>
-          </a:p>
-        </p:txBody>
-      </p:sp>
+        </p:nvGraphicFramePr>
+        <p:xfrm>
+          <a:off x="838200" y="1825625"/>
+          <a:ext cx="10515600" cy="4785360"/>
+        </p:xfrm>
+        <a:graphic>
+          <a:graphicData uri="http://schemas.openxmlformats.org/drawingml/2006/table">
+            <a:tbl>
+              <a:tblPr firstRow="1" bandRow="1">
+                <a:tableStyleId>{5C22544A-7EE6-4342-B048-85BDC9FD1C3A}</a:tableStyleId>
+              </a:tblPr>
+              <a:tblGrid>
+                <a:gridCol w="2465832">
+                  <a:extLst>
+                    <a:ext uri="{9D8B030D-6E8A-4147-A177-3AD203B41FA5}">
+                      <a16:colId xmlns:a16="http://schemas.microsoft.com/office/drawing/2014/main" val="312077786"/>
+                    </a:ext>
+                  </a:extLst>
+                </a:gridCol>
+                <a:gridCol w="8049768">
+                  <a:extLst>
+                    <a:ext uri="{9D8B030D-6E8A-4147-A177-3AD203B41FA5}">
+                      <a16:colId xmlns:a16="http://schemas.microsoft.com/office/drawing/2014/main" val="15872971"/>
+                    </a:ext>
+                  </a:extLst>
+                </a:gridCol>
+              </a:tblGrid>
+              <a:tr h="370840">
+                <a:tc>
+                  <a:txBody>
+                    <a:bodyPr/>
+                    <a:lstStyle/>
+                    <a:p>
+                      <a:r>
+                        <a:rPr lang="en-US" dirty="0"/>
+                        <a:t>Timeslot</a:t>
+                      </a:r>
+                    </a:p>
+                  </a:txBody>
+                  <a:tcPr/>
+                </a:tc>
+                <a:tc>
+                  <a:txBody>
+                    <a:bodyPr/>
+                    <a:lstStyle/>
+                    <a:p>
+                      <a:r>
+                        <a:rPr lang="en-US" dirty="0"/>
+                        <a:t>Activity</a:t>
+                      </a:r>
+                    </a:p>
+                  </a:txBody>
+                  <a:tcPr/>
+                </a:tc>
+                <a:extLst>
+                  <a:ext uri="{0D108BD9-81ED-4DB2-BD59-A6C34878D82A}">
+                    <a16:rowId xmlns:a16="http://schemas.microsoft.com/office/drawing/2014/main" val="2171546650"/>
+                  </a:ext>
+                </a:extLst>
+              </a:tr>
+              <a:tr h="370840">
+                <a:tc>
+                  <a:txBody>
+                    <a:bodyPr/>
+                    <a:lstStyle/>
+                    <a:p>
+                      <a:r>
+                        <a:rPr lang="en-US" dirty="0"/>
+                        <a:t>09:00AM – 09:30AM</a:t>
+                      </a:r>
+                    </a:p>
+                  </a:txBody>
+                  <a:tcPr/>
+                </a:tc>
+                <a:tc>
+                  <a:txBody>
+                    <a:bodyPr/>
+                    <a:lstStyle/>
+                    <a:p>
+                      <a:r>
+                        <a:rPr lang="en-US" dirty="0"/>
+                        <a:t>Introduction and Terminologies</a:t>
+                      </a:r>
+                    </a:p>
+                    <a:p>
+                      <a:r>
+                        <a:rPr lang="en-US" dirty="0"/>
+                        <a:t>Data Privacy Regulations</a:t>
+                      </a:r>
+                    </a:p>
+                  </a:txBody>
+                  <a:tcPr/>
+                </a:tc>
+                <a:extLst>
+                  <a:ext uri="{0D108BD9-81ED-4DB2-BD59-A6C34878D82A}">
+                    <a16:rowId xmlns:a16="http://schemas.microsoft.com/office/drawing/2014/main" val="3763312049"/>
+                  </a:ext>
+                </a:extLst>
+              </a:tr>
+              <a:tr h="370840">
+                <a:tc>
+                  <a:txBody>
+                    <a:bodyPr/>
+                    <a:lstStyle/>
+                    <a:p>
+                      <a:r>
+                        <a:rPr lang="en-US" dirty="0"/>
+                        <a:t>09:30AM – 10:00AM</a:t>
+                      </a:r>
+                    </a:p>
+                  </a:txBody>
+                  <a:tcPr/>
+                </a:tc>
+                <a:tc>
+                  <a:txBody>
+                    <a:bodyPr/>
+                    <a:lstStyle/>
+                    <a:p>
+                      <a:r>
+                        <a:rPr lang="en-US" dirty="0"/>
+                        <a:t>Discussion + Case Study A</a:t>
+                      </a:r>
+                    </a:p>
+                  </a:txBody>
+                  <a:tcPr/>
+                </a:tc>
+                <a:extLst>
+                  <a:ext uri="{0D108BD9-81ED-4DB2-BD59-A6C34878D82A}">
+                    <a16:rowId xmlns:a16="http://schemas.microsoft.com/office/drawing/2014/main" val="586377463"/>
+                  </a:ext>
+                </a:extLst>
+              </a:tr>
+              <a:tr h="370840">
+                <a:tc>
+                  <a:txBody>
+                    <a:bodyPr/>
+                    <a:lstStyle/>
+                    <a:p>
+                      <a:r>
+                        <a:rPr lang="en-US" dirty="0"/>
+                        <a:t>10:00AM – 10:30AM</a:t>
+                      </a:r>
+                    </a:p>
+                  </a:txBody>
+                  <a:tcPr/>
+                </a:tc>
+                <a:tc>
+                  <a:txBody>
+                    <a:bodyPr/>
+                    <a:lstStyle/>
+                    <a:p>
+                      <a:r>
+                        <a:rPr lang="en-US" dirty="0"/>
+                        <a:t>PSDSRC Overview</a:t>
+                      </a:r>
+                    </a:p>
+                    <a:p>
+                      <a:r>
+                        <a:rPr lang="en-US" dirty="0"/>
+                        <a:t>PSDSRC Recommendations 1.1</a:t>
+                      </a:r>
+                    </a:p>
+                  </a:txBody>
+                  <a:tcPr/>
+                </a:tc>
+                <a:extLst>
+                  <a:ext uri="{0D108BD9-81ED-4DB2-BD59-A6C34878D82A}">
+                    <a16:rowId xmlns:a16="http://schemas.microsoft.com/office/drawing/2014/main" val="1914748108"/>
+                  </a:ext>
+                </a:extLst>
+              </a:tr>
+              <a:tr h="370840">
+                <a:tc>
+                  <a:txBody>
+                    <a:bodyPr/>
+                    <a:lstStyle/>
+                    <a:p>
+                      <a:r>
+                        <a:rPr lang="en-US" dirty="0"/>
+                        <a:t>10:30AM – 10:50AM</a:t>
+                      </a:r>
+                    </a:p>
+                  </a:txBody>
+                  <a:tcPr/>
+                </a:tc>
+                <a:tc>
+                  <a:txBody>
+                    <a:bodyPr/>
+                    <a:lstStyle/>
+                    <a:p>
+                      <a:r>
+                        <a:rPr lang="en-US" dirty="0"/>
+                        <a:t>Case Study B</a:t>
+                      </a:r>
+                    </a:p>
+                    <a:p>
+                      <a:r>
+                        <a:rPr lang="en-US" dirty="0"/>
+                        <a:t>5 min break</a:t>
+                      </a:r>
+                    </a:p>
+                  </a:txBody>
+                  <a:tcPr/>
+                </a:tc>
+                <a:extLst>
+                  <a:ext uri="{0D108BD9-81ED-4DB2-BD59-A6C34878D82A}">
+                    <a16:rowId xmlns:a16="http://schemas.microsoft.com/office/drawing/2014/main" val="3633579291"/>
+                  </a:ext>
+                </a:extLst>
+              </a:tr>
+              <a:tr h="370840">
+                <a:tc>
+                  <a:txBody>
+                    <a:bodyPr/>
+                    <a:lstStyle/>
+                    <a:p>
+                      <a:r>
+                        <a:rPr lang="en-US" dirty="0"/>
+                        <a:t>10:50AM – 12:00PM</a:t>
+                      </a:r>
+                    </a:p>
+                  </a:txBody>
+                  <a:tcPr/>
+                </a:tc>
+                <a:tc>
+                  <a:txBody>
+                    <a:bodyPr/>
+                    <a:lstStyle/>
+                    <a:p>
+                      <a:pPr marL="0" marR="0" lvl="0" indent="0" algn="l" defTabSz="914400" rtl="0" eaLnBrk="1" fontAlgn="auto" latinLnBrk="0" hangingPunct="1">
+                        <a:lnSpc>
+                          <a:spcPct val="100000"/>
+                        </a:lnSpc>
+                        <a:spcBef>
+                          <a:spcPts val="0"/>
+                        </a:spcBef>
+                        <a:spcAft>
+                          <a:spcPts val="0"/>
+                        </a:spcAft>
+                        <a:buClrTx/>
+                        <a:buSzTx/>
+                        <a:buFontTx/>
+                        <a:buNone/>
+                        <a:tabLst/>
+                        <a:defRPr/>
+                      </a:pPr>
+                      <a:r>
+                        <a:rPr lang="en-US" dirty="0"/>
+                        <a:t>PSDSRC Recommendations 1.2 + Python hands-on</a:t>
+                      </a:r>
+                    </a:p>
+                  </a:txBody>
+                  <a:tcPr/>
+                </a:tc>
+                <a:extLst>
+                  <a:ext uri="{0D108BD9-81ED-4DB2-BD59-A6C34878D82A}">
+                    <a16:rowId xmlns:a16="http://schemas.microsoft.com/office/drawing/2014/main" val="3769776666"/>
+                  </a:ext>
+                </a:extLst>
+              </a:tr>
+              <a:tr h="370840">
+                <a:tc>
+                  <a:txBody>
+                    <a:bodyPr/>
+                    <a:lstStyle/>
+                    <a:p>
+                      <a:r>
+                        <a:rPr lang="en-US" dirty="0"/>
+                        <a:t>12:00PM – 01:30PM</a:t>
+                      </a:r>
+                    </a:p>
+                  </a:txBody>
+                  <a:tcPr/>
+                </a:tc>
+                <a:tc>
+                  <a:txBody>
+                    <a:bodyPr/>
+                    <a:lstStyle/>
+                    <a:p>
+                      <a:r>
+                        <a:rPr lang="en-US" dirty="0"/>
+                        <a:t>Lunch break</a:t>
+                      </a:r>
+                    </a:p>
+                  </a:txBody>
+                  <a:tcPr/>
+                </a:tc>
+                <a:extLst>
+                  <a:ext uri="{0D108BD9-81ED-4DB2-BD59-A6C34878D82A}">
+                    <a16:rowId xmlns:a16="http://schemas.microsoft.com/office/drawing/2014/main" val="2094738851"/>
+                  </a:ext>
+                </a:extLst>
+              </a:tr>
+              <a:tr h="370840">
+                <a:tc>
+                  <a:txBody>
+                    <a:bodyPr/>
+                    <a:lstStyle/>
+                    <a:p>
+                      <a:r>
+                        <a:rPr lang="en-US" dirty="0"/>
+                        <a:t>01:30PM – 02:30PM</a:t>
+                      </a:r>
+                    </a:p>
+                  </a:txBody>
+                  <a:tcPr/>
+                </a:tc>
+                <a:tc>
+                  <a:txBody>
+                    <a:bodyPr/>
+                    <a:lstStyle/>
+                    <a:p>
+                      <a:pPr marL="0" marR="0" lvl="0" indent="0" algn="l" defTabSz="914400" rtl="0" eaLnBrk="1" fontAlgn="auto" latinLnBrk="0" hangingPunct="1">
+                        <a:lnSpc>
+                          <a:spcPct val="100000"/>
+                        </a:lnSpc>
+                        <a:spcBef>
+                          <a:spcPts val="0"/>
+                        </a:spcBef>
+                        <a:spcAft>
+                          <a:spcPts val="0"/>
+                        </a:spcAft>
+                        <a:buClrTx/>
+                        <a:buSzTx/>
+                        <a:buFontTx/>
+                        <a:buNone/>
+                        <a:tabLst/>
+                        <a:defRPr/>
+                      </a:pPr>
+                      <a:r>
+                        <a:rPr lang="en-US" dirty="0"/>
+                        <a:t>PSDSRC Recommendations 1.3 + Python hands-on</a:t>
+                      </a:r>
+                    </a:p>
+                    <a:p>
+                      <a:pPr marL="0" marR="0" lvl="0" indent="0" algn="l" defTabSz="914400" rtl="0" eaLnBrk="1" fontAlgn="auto" latinLnBrk="0" hangingPunct="1">
+                        <a:lnSpc>
+                          <a:spcPct val="100000"/>
+                        </a:lnSpc>
+                        <a:spcBef>
+                          <a:spcPts val="0"/>
+                        </a:spcBef>
+                        <a:spcAft>
+                          <a:spcPts val="0"/>
+                        </a:spcAft>
+                        <a:buClrTx/>
+                        <a:buSzTx/>
+                        <a:buFontTx/>
+                        <a:buNone/>
+                        <a:tabLst/>
+                        <a:defRPr/>
+                      </a:pPr>
+                      <a:r>
+                        <a:rPr lang="en-US" dirty="0"/>
+                        <a:t>5 min break</a:t>
+                      </a:r>
+                    </a:p>
+                  </a:txBody>
+                  <a:tcPr/>
+                </a:tc>
+                <a:extLst>
+                  <a:ext uri="{0D108BD9-81ED-4DB2-BD59-A6C34878D82A}">
+                    <a16:rowId xmlns:a16="http://schemas.microsoft.com/office/drawing/2014/main" val="923794780"/>
+                  </a:ext>
+                </a:extLst>
+              </a:tr>
+              <a:tr h="370840">
+                <a:tc>
+                  <a:txBody>
+                    <a:bodyPr/>
+                    <a:lstStyle/>
+                    <a:p>
+                      <a:r>
+                        <a:rPr lang="en-US" dirty="0"/>
+                        <a:t>02:30PM – 03:30PM</a:t>
+                      </a:r>
+                    </a:p>
+                  </a:txBody>
+                  <a:tcPr/>
+                </a:tc>
+                <a:tc>
+                  <a:txBody>
+                    <a:bodyPr/>
+                    <a:lstStyle/>
+                    <a:p>
+                      <a:r>
+                        <a:rPr lang="en-US" dirty="0"/>
+                        <a:t>Data Anonymization Concepts and methods</a:t>
+                      </a:r>
+                    </a:p>
+                  </a:txBody>
+                  <a:tcPr/>
+                </a:tc>
+                <a:extLst>
+                  <a:ext uri="{0D108BD9-81ED-4DB2-BD59-A6C34878D82A}">
+                    <a16:rowId xmlns:a16="http://schemas.microsoft.com/office/drawing/2014/main" val="35873874"/>
+                  </a:ext>
+                </a:extLst>
+              </a:tr>
+              <a:tr h="370840">
+                <a:tc>
+                  <a:txBody>
+                    <a:bodyPr/>
+                    <a:lstStyle/>
+                    <a:p>
+                      <a:r>
+                        <a:rPr lang="en-US" dirty="0"/>
+                        <a:t>03:30PM – 04:00PM</a:t>
+                      </a:r>
+                    </a:p>
+                  </a:txBody>
+                  <a:tcPr/>
+                </a:tc>
+                <a:tc>
+                  <a:txBody>
+                    <a:bodyPr/>
+                    <a:lstStyle/>
+                    <a:p>
+                      <a:r>
+                        <a:rPr lang="en-US" dirty="0"/>
+                        <a:t>Conclusion + Q&amp;A</a:t>
+                      </a:r>
+                    </a:p>
+                  </a:txBody>
+                  <a:tcPr/>
+                </a:tc>
+                <a:extLst>
+                  <a:ext uri="{0D108BD9-81ED-4DB2-BD59-A6C34878D82A}">
+                    <a16:rowId xmlns:a16="http://schemas.microsoft.com/office/drawing/2014/main" val="815086016"/>
+                  </a:ext>
+                </a:extLst>
+              </a:tr>
+            </a:tbl>
+          </a:graphicData>
+        </a:graphic>
+      </p:graphicFrame>
     </p:spTree>
     <p:extLst>
       <p:ext uri="{BB962C8B-B14F-4D97-AF65-F5344CB8AC3E}">
-        <p14:creationId xmlns:p14="http://schemas.microsoft.com/office/powerpoint/2010/main" val="1217361202"/>
+        <p14:creationId xmlns:p14="http://schemas.microsoft.com/office/powerpoint/2010/main" val="2689399936"/>
       </p:ext>
     </p:extLst>
   </p:cSld>

</xml_diff>